<commit_message>
docs: class diagram ppt
시퀀스 다이어그램 수정으로 인한 클래스 다이어그램 수정
UC0011 ~ UC0015
</commit_message>
<xml_diff>
--- a/Class Design.pptx
+++ b/Class Design.pptx
@@ -215,7 +215,7 @@
       </p14:sectionLst>
     </p:ext>
     <p:ext uri="{EFAFB233-063F-42B5-8137-9DF3F51BA10A}">
-      <p15:sldGuideLst xmlns:p15="http://schemas.microsoft.com/office/powerpoint/2012/main">
+      <p15:sldGuideLst xmlns:p15="http://schemas.microsoft.com/office/powerpoint/2012/main" xmlns="">
         <p15:guide id="1" orient="horz">
           <p15:clr>
             <a:srgbClr val="A4A3A4"/>
@@ -234,7 +234,7 @@
       </p15:sldGuideLst>
     </p:ext>
     <p:ext uri="{2D200454-40CA-4A62-9FC3-DE9A4176ACB9}">
-      <p15:notesGuideLst xmlns:p15="http://schemas.microsoft.com/office/powerpoint/2012/main">
+      <p15:notesGuideLst xmlns:p15="http://schemas.microsoft.com/office/powerpoint/2012/main" xmlns="">
         <p15:guide id="1" orient="horz" pos="3126">
           <p15:clr>
             <a:srgbClr val="A4A3A4"/>
@@ -1303,6 +1303,10 @@
             </a:lvl1pPr>
           </a:lstStyle>
           <a:p>
+            <a:r>
+              <a:rPr lang="en-US" altLang="ko-KR" dirty="0"/>
+              <a:t/>
+            </a:r>
             <a:br>
               <a:rPr lang="en-US" altLang="ko-KR" dirty="0"/>
             </a:br>
@@ -1364,28 +1368,28 @@
                 <a:gridCol w="1022523">
                   <a:extLst>
                     <a:ext uri="{9D8B030D-6E8A-4147-A177-3AD203B41FA5}">
-                      <a16:colId xmlns:a16="http://schemas.microsoft.com/office/drawing/2014/main" val="20000"/>
+                      <a16:colId xmlns:a16="http://schemas.microsoft.com/office/drawing/2014/main" xmlns="" val="20000"/>
                     </a:ext>
                   </a:extLst>
                 </a:gridCol>
                 <a:gridCol w="3439486">
                   <a:extLst>
                     <a:ext uri="{9D8B030D-6E8A-4147-A177-3AD203B41FA5}">
-                      <a16:colId xmlns:a16="http://schemas.microsoft.com/office/drawing/2014/main" val="20001"/>
+                      <a16:colId xmlns:a16="http://schemas.microsoft.com/office/drawing/2014/main" xmlns="" val="20001"/>
                     </a:ext>
                   </a:extLst>
                 </a:gridCol>
                 <a:gridCol w="947956">
                   <a:extLst>
                     <a:ext uri="{9D8B030D-6E8A-4147-A177-3AD203B41FA5}">
-                      <a16:colId xmlns:a16="http://schemas.microsoft.com/office/drawing/2014/main" val="20002"/>
+                      <a16:colId xmlns:a16="http://schemas.microsoft.com/office/drawing/2014/main" xmlns="" val="20002"/>
                     </a:ext>
                   </a:extLst>
                 </a:gridCol>
                 <a:gridCol w="3523377">
                   <a:extLst>
                     <a:ext uri="{9D8B030D-6E8A-4147-A177-3AD203B41FA5}">
-                      <a16:colId xmlns:a16="http://schemas.microsoft.com/office/drawing/2014/main" val="20003"/>
+                      <a16:colId xmlns:a16="http://schemas.microsoft.com/office/drawing/2014/main" xmlns="" val="20003"/>
                     </a:ext>
                   </a:extLst>
                 </a:gridCol>
@@ -1773,7 +1777,7 @@
                 </a:tc>
                 <a:extLst>
                   <a:ext uri="{0D108BD9-81ED-4DB2-BD59-A6C34878D82A}">
-                    <a16:rowId xmlns:a16="http://schemas.microsoft.com/office/drawing/2014/main" val="10000"/>
+                    <a16:rowId xmlns:a16="http://schemas.microsoft.com/office/drawing/2014/main" xmlns="" val="10000"/>
                   </a:ext>
                 </a:extLst>
               </a:tr>
@@ -2132,7 +2136,7 @@
                 </a:tc>
                 <a:extLst>
                   <a:ext uri="{0D108BD9-81ED-4DB2-BD59-A6C34878D82A}">
-                    <a16:rowId xmlns:a16="http://schemas.microsoft.com/office/drawing/2014/main" val="10001"/>
+                    <a16:rowId xmlns:a16="http://schemas.microsoft.com/office/drawing/2014/main" xmlns="" val="10001"/>
                   </a:ext>
                 </a:extLst>
               </a:tr>
@@ -3266,6 +3270,10 @@
           <a:bodyPr/>
           <a:lstStyle/>
           <a:p>
+            <a:r>
+              <a:rPr lang="en-US" altLang="ko-KR" dirty="0"/>
+              <a:t/>
+            </a:r>
             <a:br>
               <a:rPr lang="en-US" altLang="ko-KR" dirty="0"/>
             </a:br>
@@ -3348,7 +3356,7 @@
           <p:cNvPr id="2" name="바닥글 개체 틀 1">
             <a:extLst>
               <a:ext uri="{FF2B5EF4-FFF2-40B4-BE49-F238E27FC236}">
-                <a16:creationId xmlns:a16="http://schemas.microsoft.com/office/drawing/2014/main" id="{6AF1B24E-7C31-D352-239D-5307CEE5F3BA}"/>
+                <a16:creationId xmlns:a16="http://schemas.microsoft.com/office/drawing/2014/main" xmlns="" id="{6AF1B24E-7C31-D352-239D-5307CEE5F3BA}"/>
               </a:ext>
             </a:extLst>
           </p:cNvPr>
@@ -3378,7 +3386,7 @@
           <p:cNvPr id="3" name="표 3">
             <a:extLst>
               <a:ext uri="{FF2B5EF4-FFF2-40B4-BE49-F238E27FC236}">
-                <a16:creationId xmlns:a16="http://schemas.microsoft.com/office/drawing/2014/main" id="{83E41BCA-5946-F23B-DDB2-A15A43C3D242}"/>
+                <a16:creationId xmlns:a16="http://schemas.microsoft.com/office/drawing/2014/main" xmlns="" id="{83E41BCA-5946-F23B-DDB2-A15A43C3D242}"/>
               </a:ext>
             </a:extLst>
           </p:cNvPr>
@@ -3401,28 +3409,28 @@
                 <a:gridCol w="1143368">
                   <a:extLst>
                     <a:ext uri="{9D8B030D-6E8A-4147-A177-3AD203B41FA5}">
-                      <a16:colId xmlns:a16="http://schemas.microsoft.com/office/drawing/2014/main" val="2009367983"/>
+                      <a16:colId xmlns:a16="http://schemas.microsoft.com/office/drawing/2014/main" xmlns="" val="2009367983"/>
                     </a:ext>
                   </a:extLst>
                 </a:gridCol>
                 <a:gridCol w="3328368">
                   <a:extLst>
                     <a:ext uri="{9D8B030D-6E8A-4147-A177-3AD203B41FA5}">
-                      <a16:colId xmlns:a16="http://schemas.microsoft.com/office/drawing/2014/main" val="3488438301"/>
+                      <a16:colId xmlns:a16="http://schemas.microsoft.com/office/drawing/2014/main" xmlns="" val="3488438301"/>
                     </a:ext>
                   </a:extLst>
                 </a:gridCol>
                 <a:gridCol w="1159043">
                   <a:extLst>
                     <a:ext uri="{9D8B030D-6E8A-4147-A177-3AD203B41FA5}">
-                      <a16:colId xmlns:a16="http://schemas.microsoft.com/office/drawing/2014/main" val="57341383"/>
+                      <a16:colId xmlns:a16="http://schemas.microsoft.com/office/drawing/2014/main" xmlns="" val="57341383"/>
                     </a:ext>
                   </a:extLst>
                 </a:gridCol>
                 <a:gridCol w="3312693">
                   <a:extLst>
                     <a:ext uri="{9D8B030D-6E8A-4147-A177-3AD203B41FA5}">
-                      <a16:colId xmlns:a16="http://schemas.microsoft.com/office/drawing/2014/main" val="3830577718"/>
+                      <a16:colId xmlns:a16="http://schemas.microsoft.com/office/drawing/2014/main" xmlns="" val="3830577718"/>
                     </a:ext>
                   </a:extLst>
                 </a:gridCol>
@@ -3762,7 +3770,7 @@
                 </a:tc>
                 <a:extLst>
                   <a:ext uri="{0D108BD9-81ED-4DB2-BD59-A6C34878D82A}">
-                    <a16:rowId xmlns:a16="http://schemas.microsoft.com/office/drawing/2014/main" val="2378104980"/>
+                    <a16:rowId xmlns:a16="http://schemas.microsoft.com/office/drawing/2014/main" xmlns="" val="2378104980"/>
                   </a:ext>
                 </a:extLst>
               </a:tr>
@@ -3939,7 +3947,7 @@
                 </a:tc>
                 <a:extLst>
                   <a:ext uri="{0D108BD9-81ED-4DB2-BD59-A6C34878D82A}">
-                    <a16:rowId xmlns:a16="http://schemas.microsoft.com/office/drawing/2014/main" val="966726498"/>
+                    <a16:rowId xmlns:a16="http://schemas.microsoft.com/office/drawing/2014/main" xmlns="" val="966726498"/>
                   </a:ext>
                 </a:extLst>
               </a:tr>
@@ -3952,7 +3960,7 @@
           <p:cNvPr id="5" name="그림 4">
             <a:extLst>
               <a:ext uri="{FF2B5EF4-FFF2-40B4-BE49-F238E27FC236}">
-                <a16:creationId xmlns:a16="http://schemas.microsoft.com/office/drawing/2014/main" id="{3FF81842-15B2-2506-9FBA-FB4A02F47276}"/>
+                <a16:creationId xmlns:a16="http://schemas.microsoft.com/office/drawing/2014/main" xmlns="" id="{3FF81842-15B2-2506-9FBA-FB4A02F47276}"/>
               </a:ext>
             </a:extLst>
           </p:cNvPr>
@@ -3982,7 +3990,7 @@
           <p:cNvPr id="8" name="TextBox 7">
             <a:extLst>
               <a:ext uri="{FF2B5EF4-FFF2-40B4-BE49-F238E27FC236}">
-                <a16:creationId xmlns:a16="http://schemas.microsoft.com/office/drawing/2014/main" id="{CC94A419-470A-AA92-C683-6065F29D9183}"/>
+                <a16:creationId xmlns:a16="http://schemas.microsoft.com/office/drawing/2014/main" xmlns="" id="{CC94A419-470A-AA92-C683-6065F29D9183}"/>
               </a:ext>
             </a:extLst>
           </p:cNvPr>
@@ -4056,7 +4064,7 @@
           <p:cNvPr id="2" name="바닥글 개체 틀 1">
             <a:extLst>
               <a:ext uri="{FF2B5EF4-FFF2-40B4-BE49-F238E27FC236}">
-                <a16:creationId xmlns:a16="http://schemas.microsoft.com/office/drawing/2014/main" id="{6AF1B24E-7C31-D352-239D-5307CEE5F3BA}"/>
+                <a16:creationId xmlns:a16="http://schemas.microsoft.com/office/drawing/2014/main" xmlns="" id="{6AF1B24E-7C31-D352-239D-5307CEE5F3BA}"/>
               </a:ext>
             </a:extLst>
           </p:cNvPr>
@@ -4086,7 +4094,7 @@
           <p:cNvPr id="3" name="표 3">
             <a:extLst>
               <a:ext uri="{FF2B5EF4-FFF2-40B4-BE49-F238E27FC236}">
-                <a16:creationId xmlns:a16="http://schemas.microsoft.com/office/drawing/2014/main" id="{83E41BCA-5946-F23B-DDB2-A15A43C3D242}"/>
+                <a16:creationId xmlns:a16="http://schemas.microsoft.com/office/drawing/2014/main" xmlns="" id="{83E41BCA-5946-F23B-DDB2-A15A43C3D242}"/>
               </a:ext>
             </a:extLst>
           </p:cNvPr>
@@ -4109,28 +4117,28 @@
                 <a:gridCol w="1143368">
                   <a:extLst>
                     <a:ext uri="{9D8B030D-6E8A-4147-A177-3AD203B41FA5}">
-                      <a16:colId xmlns:a16="http://schemas.microsoft.com/office/drawing/2014/main" val="2009367983"/>
+                      <a16:colId xmlns:a16="http://schemas.microsoft.com/office/drawing/2014/main" xmlns="" val="2009367983"/>
                     </a:ext>
                   </a:extLst>
                 </a:gridCol>
                 <a:gridCol w="3328368">
                   <a:extLst>
                     <a:ext uri="{9D8B030D-6E8A-4147-A177-3AD203B41FA5}">
-                      <a16:colId xmlns:a16="http://schemas.microsoft.com/office/drawing/2014/main" val="3488438301"/>
+                      <a16:colId xmlns:a16="http://schemas.microsoft.com/office/drawing/2014/main" xmlns="" val="3488438301"/>
                     </a:ext>
                   </a:extLst>
                 </a:gridCol>
                 <a:gridCol w="1159043">
                   <a:extLst>
                     <a:ext uri="{9D8B030D-6E8A-4147-A177-3AD203B41FA5}">
-                      <a16:colId xmlns:a16="http://schemas.microsoft.com/office/drawing/2014/main" val="57341383"/>
+                      <a16:colId xmlns:a16="http://schemas.microsoft.com/office/drawing/2014/main" xmlns="" val="57341383"/>
                     </a:ext>
                   </a:extLst>
                 </a:gridCol>
                 <a:gridCol w="3312693">
                   <a:extLst>
                     <a:ext uri="{9D8B030D-6E8A-4147-A177-3AD203B41FA5}">
-                      <a16:colId xmlns:a16="http://schemas.microsoft.com/office/drawing/2014/main" val="3830577718"/>
+                      <a16:colId xmlns:a16="http://schemas.microsoft.com/office/drawing/2014/main" xmlns="" val="3830577718"/>
                     </a:ext>
                   </a:extLst>
                 </a:gridCol>
@@ -4470,7 +4478,7 @@
                 </a:tc>
                 <a:extLst>
                   <a:ext uri="{0D108BD9-81ED-4DB2-BD59-A6C34878D82A}">
-                    <a16:rowId xmlns:a16="http://schemas.microsoft.com/office/drawing/2014/main" val="2378104980"/>
+                    <a16:rowId xmlns:a16="http://schemas.microsoft.com/office/drawing/2014/main" xmlns="" val="2378104980"/>
                   </a:ext>
                 </a:extLst>
               </a:tr>
@@ -4647,7 +4655,7 @@
                 </a:tc>
                 <a:extLst>
                   <a:ext uri="{0D108BD9-81ED-4DB2-BD59-A6C34878D82A}">
-                    <a16:rowId xmlns:a16="http://schemas.microsoft.com/office/drawing/2014/main" val="966726498"/>
+                    <a16:rowId xmlns:a16="http://schemas.microsoft.com/office/drawing/2014/main" xmlns="" val="966726498"/>
                   </a:ext>
                 </a:extLst>
               </a:tr>
@@ -4660,7 +4668,7 @@
           <p:cNvPr id="4" name="그림 3">
             <a:extLst>
               <a:ext uri="{FF2B5EF4-FFF2-40B4-BE49-F238E27FC236}">
-                <a16:creationId xmlns:a16="http://schemas.microsoft.com/office/drawing/2014/main" id="{A4444FDE-4379-CD21-4122-BAD933BDB13E}"/>
+                <a16:creationId xmlns:a16="http://schemas.microsoft.com/office/drawing/2014/main" xmlns="" id="{A4444FDE-4379-CD21-4122-BAD933BDB13E}"/>
               </a:ext>
             </a:extLst>
           </p:cNvPr>
@@ -4726,7 +4734,7 @@
           <p:cNvPr id="2" name="바닥글 개체 틀 1">
             <a:extLst>
               <a:ext uri="{FF2B5EF4-FFF2-40B4-BE49-F238E27FC236}">
-                <a16:creationId xmlns:a16="http://schemas.microsoft.com/office/drawing/2014/main" id="{6AF1B24E-7C31-D352-239D-5307CEE5F3BA}"/>
+                <a16:creationId xmlns:a16="http://schemas.microsoft.com/office/drawing/2014/main" xmlns="" id="{6AF1B24E-7C31-D352-239D-5307CEE5F3BA}"/>
               </a:ext>
             </a:extLst>
           </p:cNvPr>
@@ -4756,7 +4764,7 @@
           <p:cNvPr id="3" name="표 3">
             <a:extLst>
               <a:ext uri="{FF2B5EF4-FFF2-40B4-BE49-F238E27FC236}">
-                <a16:creationId xmlns:a16="http://schemas.microsoft.com/office/drawing/2014/main" id="{83E41BCA-5946-F23B-DDB2-A15A43C3D242}"/>
+                <a16:creationId xmlns:a16="http://schemas.microsoft.com/office/drawing/2014/main" xmlns="" id="{83E41BCA-5946-F23B-DDB2-A15A43C3D242}"/>
               </a:ext>
             </a:extLst>
           </p:cNvPr>
@@ -4779,28 +4787,28 @@
                 <a:gridCol w="1143368">
                   <a:extLst>
                     <a:ext uri="{9D8B030D-6E8A-4147-A177-3AD203B41FA5}">
-                      <a16:colId xmlns:a16="http://schemas.microsoft.com/office/drawing/2014/main" val="2009367983"/>
+                      <a16:colId xmlns:a16="http://schemas.microsoft.com/office/drawing/2014/main" xmlns="" val="2009367983"/>
                     </a:ext>
                   </a:extLst>
                 </a:gridCol>
                 <a:gridCol w="3328368">
                   <a:extLst>
                     <a:ext uri="{9D8B030D-6E8A-4147-A177-3AD203B41FA5}">
-                      <a16:colId xmlns:a16="http://schemas.microsoft.com/office/drawing/2014/main" val="3488438301"/>
+                      <a16:colId xmlns:a16="http://schemas.microsoft.com/office/drawing/2014/main" xmlns="" val="3488438301"/>
                     </a:ext>
                   </a:extLst>
                 </a:gridCol>
                 <a:gridCol w="1159043">
                   <a:extLst>
                     <a:ext uri="{9D8B030D-6E8A-4147-A177-3AD203B41FA5}">
-                      <a16:colId xmlns:a16="http://schemas.microsoft.com/office/drawing/2014/main" val="57341383"/>
+                      <a16:colId xmlns:a16="http://schemas.microsoft.com/office/drawing/2014/main" xmlns="" val="57341383"/>
                     </a:ext>
                   </a:extLst>
                 </a:gridCol>
                 <a:gridCol w="3312693">
                   <a:extLst>
                     <a:ext uri="{9D8B030D-6E8A-4147-A177-3AD203B41FA5}">
-                      <a16:colId xmlns:a16="http://schemas.microsoft.com/office/drawing/2014/main" val="3830577718"/>
+                      <a16:colId xmlns:a16="http://schemas.microsoft.com/office/drawing/2014/main" xmlns="" val="3830577718"/>
                     </a:ext>
                   </a:extLst>
                 </a:gridCol>
@@ -5140,7 +5148,7 @@
                 </a:tc>
                 <a:extLst>
                   <a:ext uri="{0D108BD9-81ED-4DB2-BD59-A6C34878D82A}">
-                    <a16:rowId xmlns:a16="http://schemas.microsoft.com/office/drawing/2014/main" val="2378104980"/>
+                    <a16:rowId xmlns:a16="http://schemas.microsoft.com/office/drawing/2014/main" xmlns="" val="2378104980"/>
                   </a:ext>
                 </a:extLst>
               </a:tr>
@@ -5317,7 +5325,7 @@
                 </a:tc>
                 <a:extLst>
                   <a:ext uri="{0D108BD9-81ED-4DB2-BD59-A6C34878D82A}">
-                    <a16:rowId xmlns:a16="http://schemas.microsoft.com/office/drawing/2014/main" val="966726498"/>
+                    <a16:rowId xmlns:a16="http://schemas.microsoft.com/office/drawing/2014/main" xmlns="" val="966726498"/>
                   </a:ext>
                 </a:extLst>
               </a:tr>
@@ -5330,7 +5338,7 @@
           <p:cNvPr id="4" name="그림 3">
             <a:extLst>
               <a:ext uri="{FF2B5EF4-FFF2-40B4-BE49-F238E27FC236}">
-                <a16:creationId xmlns:a16="http://schemas.microsoft.com/office/drawing/2014/main" id="{68851F8C-068B-5874-02FD-B0D5A5F743DE}"/>
+                <a16:creationId xmlns:a16="http://schemas.microsoft.com/office/drawing/2014/main" xmlns="" id="{68851F8C-068B-5874-02FD-B0D5A5F743DE}"/>
               </a:ext>
             </a:extLst>
           </p:cNvPr>
@@ -5396,7 +5404,7 @@
           <p:cNvPr id="2" name="바닥글 개체 틀 1">
             <a:extLst>
               <a:ext uri="{FF2B5EF4-FFF2-40B4-BE49-F238E27FC236}">
-                <a16:creationId xmlns:a16="http://schemas.microsoft.com/office/drawing/2014/main" id="{6AF1B24E-7C31-D352-239D-5307CEE5F3BA}"/>
+                <a16:creationId xmlns:a16="http://schemas.microsoft.com/office/drawing/2014/main" xmlns="" id="{6AF1B24E-7C31-D352-239D-5307CEE5F3BA}"/>
               </a:ext>
             </a:extLst>
           </p:cNvPr>
@@ -5426,7 +5434,7 @@
           <p:cNvPr id="3" name="표 3">
             <a:extLst>
               <a:ext uri="{FF2B5EF4-FFF2-40B4-BE49-F238E27FC236}">
-                <a16:creationId xmlns:a16="http://schemas.microsoft.com/office/drawing/2014/main" id="{83E41BCA-5946-F23B-DDB2-A15A43C3D242}"/>
+                <a16:creationId xmlns:a16="http://schemas.microsoft.com/office/drawing/2014/main" xmlns="" id="{83E41BCA-5946-F23B-DDB2-A15A43C3D242}"/>
               </a:ext>
             </a:extLst>
           </p:cNvPr>
@@ -5449,28 +5457,28 @@
                 <a:gridCol w="1143368">
                   <a:extLst>
                     <a:ext uri="{9D8B030D-6E8A-4147-A177-3AD203B41FA5}">
-                      <a16:colId xmlns:a16="http://schemas.microsoft.com/office/drawing/2014/main" val="2009367983"/>
+                      <a16:colId xmlns:a16="http://schemas.microsoft.com/office/drawing/2014/main" xmlns="" val="2009367983"/>
                     </a:ext>
                   </a:extLst>
                 </a:gridCol>
                 <a:gridCol w="3328368">
                   <a:extLst>
                     <a:ext uri="{9D8B030D-6E8A-4147-A177-3AD203B41FA5}">
-                      <a16:colId xmlns:a16="http://schemas.microsoft.com/office/drawing/2014/main" val="3488438301"/>
+                      <a16:colId xmlns:a16="http://schemas.microsoft.com/office/drawing/2014/main" xmlns="" val="3488438301"/>
                     </a:ext>
                   </a:extLst>
                 </a:gridCol>
                 <a:gridCol w="1159043">
                   <a:extLst>
                     <a:ext uri="{9D8B030D-6E8A-4147-A177-3AD203B41FA5}">
-                      <a16:colId xmlns:a16="http://schemas.microsoft.com/office/drawing/2014/main" val="57341383"/>
+                      <a16:colId xmlns:a16="http://schemas.microsoft.com/office/drawing/2014/main" xmlns="" val="57341383"/>
                     </a:ext>
                   </a:extLst>
                 </a:gridCol>
                 <a:gridCol w="3312693">
                   <a:extLst>
                     <a:ext uri="{9D8B030D-6E8A-4147-A177-3AD203B41FA5}">
-                      <a16:colId xmlns:a16="http://schemas.microsoft.com/office/drawing/2014/main" val="3830577718"/>
+                      <a16:colId xmlns:a16="http://schemas.microsoft.com/office/drawing/2014/main" xmlns="" val="3830577718"/>
                     </a:ext>
                   </a:extLst>
                 </a:gridCol>
@@ -5810,7 +5818,7 @@
                 </a:tc>
                 <a:extLst>
                   <a:ext uri="{0D108BD9-81ED-4DB2-BD59-A6C34878D82A}">
-                    <a16:rowId xmlns:a16="http://schemas.microsoft.com/office/drawing/2014/main" val="2378104980"/>
+                    <a16:rowId xmlns:a16="http://schemas.microsoft.com/office/drawing/2014/main" xmlns="" val="2378104980"/>
                   </a:ext>
                 </a:extLst>
               </a:tr>
@@ -5987,7 +5995,7 @@
                 </a:tc>
                 <a:extLst>
                   <a:ext uri="{0D108BD9-81ED-4DB2-BD59-A6C34878D82A}">
-                    <a16:rowId xmlns:a16="http://schemas.microsoft.com/office/drawing/2014/main" val="966726498"/>
+                    <a16:rowId xmlns:a16="http://schemas.microsoft.com/office/drawing/2014/main" xmlns="" val="966726498"/>
                   </a:ext>
                 </a:extLst>
               </a:tr>
@@ -6000,7 +6008,7 @@
           <p:cNvPr id="4" name="그림 3">
             <a:extLst>
               <a:ext uri="{FF2B5EF4-FFF2-40B4-BE49-F238E27FC236}">
-                <a16:creationId xmlns:a16="http://schemas.microsoft.com/office/drawing/2014/main" id="{70C4FBB0-267D-75C3-4D09-B2E787CDD3E5}"/>
+                <a16:creationId xmlns:a16="http://schemas.microsoft.com/office/drawing/2014/main" xmlns="" id="{70C4FBB0-267D-75C3-4D09-B2E787CDD3E5}"/>
               </a:ext>
             </a:extLst>
           </p:cNvPr>
@@ -6066,7 +6074,7 @@
           <p:cNvPr id="2" name="바닥글 개체 틀 1">
             <a:extLst>
               <a:ext uri="{FF2B5EF4-FFF2-40B4-BE49-F238E27FC236}">
-                <a16:creationId xmlns:a16="http://schemas.microsoft.com/office/drawing/2014/main" id="{6AF1B24E-7C31-D352-239D-5307CEE5F3BA}"/>
+                <a16:creationId xmlns:a16="http://schemas.microsoft.com/office/drawing/2014/main" xmlns="" id="{6AF1B24E-7C31-D352-239D-5307CEE5F3BA}"/>
               </a:ext>
             </a:extLst>
           </p:cNvPr>
@@ -6096,7 +6104,7 @@
           <p:cNvPr id="3" name="표 3">
             <a:extLst>
               <a:ext uri="{FF2B5EF4-FFF2-40B4-BE49-F238E27FC236}">
-                <a16:creationId xmlns:a16="http://schemas.microsoft.com/office/drawing/2014/main" id="{83E41BCA-5946-F23B-DDB2-A15A43C3D242}"/>
+                <a16:creationId xmlns:a16="http://schemas.microsoft.com/office/drawing/2014/main" xmlns="" id="{83E41BCA-5946-F23B-DDB2-A15A43C3D242}"/>
               </a:ext>
             </a:extLst>
           </p:cNvPr>
@@ -6119,28 +6127,28 @@
                 <a:gridCol w="1143368">
                   <a:extLst>
                     <a:ext uri="{9D8B030D-6E8A-4147-A177-3AD203B41FA5}">
-                      <a16:colId xmlns:a16="http://schemas.microsoft.com/office/drawing/2014/main" val="2009367983"/>
+                      <a16:colId xmlns:a16="http://schemas.microsoft.com/office/drawing/2014/main" xmlns="" val="2009367983"/>
                     </a:ext>
                   </a:extLst>
                 </a:gridCol>
                 <a:gridCol w="3328368">
                   <a:extLst>
                     <a:ext uri="{9D8B030D-6E8A-4147-A177-3AD203B41FA5}">
-                      <a16:colId xmlns:a16="http://schemas.microsoft.com/office/drawing/2014/main" val="3488438301"/>
+                      <a16:colId xmlns:a16="http://schemas.microsoft.com/office/drawing/2014/main" xmlns="" val="3488438301"/>
                     </a:ext>
                   </a:extLst>
                 </a:gridCol>
                 <a:gridCol w="1159043">
                   <a:extLst>
                     <a:ext uri="{9D8B030D-6E8A-4147-A177-3AD203B41FA5}">
-                      <a16:colId xmlns:a16="http://schemas.microsoft.com/office/drawing/2014/main" val="57341383"/>
+                      <a16:colId xmlns:a16="http://schemas.microsoft.com/office/drawing/2014/main" xmlns="" val="57341383"/>
                     </a:ext>
                   </a:extLst>
                 </a:gridCol>
                 <a:gridCol w="3312693">
                   <a:extLst>
                     <a:ext uri="{9D8B030D-6E8A-4147-A177-3AD203B41FA5}">
-                      <a16:colId xmlns:a16="http://schemas.microsoft.com/office/drawing/2014/main" val="3830577718"/>
+                      <a16:colId xmlns:a16="http://schemas.microsoft.com/office/drawing/2014/main" xmlns="" val="3830577718"/>
                     </a:ext>
                   </a:extLst>
                 </a:gridCol>
@@ -6480,7 +6488,7 @@
                 </a:tc>
                 <a:extLst>
                   <a:ext uri="{0D108BD9-81ED-4DB2-BD59-A6C34878D82A}">
-                    <a16:rowId xmlns:a16="http://schemas.microsoft.com/office/drawing/2014/main" val="2378104980"/>
+                    <a16:rowId xmlns:a16="http://schemas.microsoft.com/office/drawing/2014/main" xmlns="" val="2378104980"/>
                   </a:ext>
                 </a:extLst>
               </a:tr>
@@ -6657,7 +6665,7 @@
                 </a:tc>
                 <a:extLst>
                   <a:ext uri="{0D108BD9-81ED-4DB2-BD59-A6C34878D82A}">
-                    <a16:rowId xmlns:a16="http://schemas.microsoft.com/office/drawing/2014/main" val="966726498"/>
+                    <a16:rowId xmlns:a16="http://schemas.microsoft.com/office/drawing/2014/main" xmlns="" val="966726498"/>
                   </a:ext>
                 </a:extLst>
               </a:tr>
@@ -6670,7 +6678,7 @@
           <p:cNvPr id="4" name="그림 3">
             <a:extLst>
               <a:ext uri="{FF2B5EF4-FFF2-40B4-BE49-F238E27FC236}">
-                <a16:creationId xmlns:a16="http://schemas.microsoft.com/office/drawing/2014/main" id="{B9C68524-6977-9D30-0908-03F66B3DA902}"/>
+                <a16:creationId xmlns:a16="http://schemas.microsoft.com/office/drawing/2014/main" xmlns="" id="{B9C68524-6977-9D30-0908-03F66B3DA902}"/>
               </a:ext>
             </a:extLst>
           </p:cNvPr>
@@ -6736,7 +6744,7 @@
           <p:cNvPr id="2" name="바닥글 개체 틀 1">
             <a:extLst>
               <a:ext uri="{FF2B5EF4-FFF2-40B4-BE49-F238E27FC236}">
-                <a16:creationId xmlns:a16="http://schemas.microsoft.com/office/drawing/2014/main" id="{6AF1B24E-7C31-D352-239D-5307CEE5F3BA}"/>
+                <a16:creationId xmlns:a16="http://schemas.microsoft.com/office/drawing/2014/main" xmlns="" id="{6AF1B24E-7C31-D352-239D-5307CEE5F3BA}"/>
               </a:ext>
             </a:extLst>
           </p:cNvPr>
@@ -6766,7 +6774,7 @@
           <p:cNvPr id="3" name="표 3">
             <a:extLst>
               <a:ext uri="{FF2B5EF4-FFF2-40B4-BE49-F238E27FC236}">
-                <a16:creationId xmlns:a16="http://schemas.microsoft.com/office/drawing/2014/main" id="{83E41BCA-5946-F23B-DDB2-A15A43C3D242}"/>
+                <a16:creationId xmlns:a16="http://schemas.microsoft.com/office/drawing/2014/main" xmlns="" id="{83E41BCA-5946-F23B-DDB2-A15A43C3D242}"/>
               </a:ext>
             </a:extLst>
           </p:cNvPr>
@@ -6789,28 +6797,28 @@
                 <a:gridCol w="1143368">
                   <a:extLst>
                     <a:ext uri="{9D8B030D-6E8A-4147-A177-3AD203B41FA5}">
-                      <a16:colId xmlns:a16="http://schemas.microsoft.com/office/drawing/2014/main" val="2009367983"/>
+                      <a16:colId xmlns:a16="http://schemas.microsoft.com/office/drawing/2014/main" xmlns="" val="2009367983"/>
                     </a:ext>
                   </a:extLst>
                 </a:gridCol>
                 <a:gridCol w="3328368">
                   <a:extLst>
                     <a:ext uri="{9D8B030D-6E8A-4147-A177-3AD203B41FA5}">
-                      <a16:colId xmlns:a16="http://schemas.microsoft.com/office/drawing/2014/main" val="3488438301"/>
+                      <a16:colId xmlns:a16="http://schemas.microsoft.com/office/drawing/2014/main" xmlns="" val="3488438301"/>
                     </a:ext>
                   </a:extLst>
                 </a:gridCol>
                 <a:gridCol w="1159043">
                   <a:extLst>
                     <a:ext uri="{9D8B030D-6E8A-4147-A177-3AD203B41FA5}">
-                      <a16:colId xmlns:a16="http://schemas.microsoft.com/office/drawing/2014/main" val="57341383"/>
+                      <a16:colId xmlns:a16="http://schemas.microsoft.com/office/drawing/2014/main" xmlns="" val="57341383"/>
                     </a:ext>
                   </a:extLst>
                 </a:gridCol>
                 <a:gridCol w="3312693">
                   <a:extLst>
                     <a:ext uri="{9D8B030D-6E8A-4147-A177-3AD203B41FA5}">
-                      <a16:colId xmlns:a16="http://schemas.microsoft.com/office/drawing/2014/main" val="3830577718"/>
+                      <a16:colId xmlns:a16="http://schemas.microsoft.com/office/drawing/2014/main" xmlns="" val="3830577718"/>
                     </a:ext>
                   </a:extLst>
                 </a:gridCol>
@@ -7150,7 +7158,7 @@
                 </a:tc>
                 <a:extLst>
                   <a:ext uri="{0D108BD9-81ED-4DB2-BD59-A6C34878D82A}">
-                    <a16:rowId xmlns:a16="http://schemas.microsoft.com/office/drawing/2014/main" val="2378104980"/>
+                    <a16:rowId xmlns:a16="http://schemas.microsoft.com/office/drawing/2014/main" xmlns="" val="2378104980"/>
                   </a:ext>
                 </a:extLst>
               </a:tr>
@@ -7327,7 +7335,7 @@
                 </a:tc>
                 <a:extLst>
                   <a:ext uri="{0D108BD9-81ED-4DB2-BD59-A6C34878D82A}">
-                    <a16:rowId xmlns:a16="http://schemas.microsoft.com/office/drawing/2014/main" val="966726498"/>
+                    <a16:rowId xmlns:a16="http://schemas.microsoft.com/office/drawing/2014/main" xmlns="" val="966726498"/>
                   </a:ext>
                 </a:extLst>
               </a:tr>
@@ -7340,7 +7348,7 @@
           <p:cNvPr id="4" name="그림 3">
             <a:extLst>
               <a:ext uri="{FF2B5EF4-FFF2-40B4-BE49-F238E27FC236}">
-                <a16:creationId xmlns:a16="http://schemas.microsoft.com/office/drawing/2014/main" id="{00FDC5BF-6B3A-B9A4-6307-CB5AEAA7E7B0}"/>
+                <a16:creationId xmlns:a16="http://schemas.microsoft.com/office/drawing/2014/main" xmlns="" id="{00FDC5BF-6B3A-B9A4-6307-CB5AEAA7E7B0}"/>
               </a:ext>
             </a:extLst>
           </p:cNvPr>
@@ -7406,7 +7414,7 @@
           <p:cNvPr id="2" name="바닥글 개체 틀 1">
             <a:extLst>
               <a:ext uri="{FF2B5EF4-FFF2-40B4-BE49-F238E27FC236}">
-                <a16:creationId xmlns:a16="http://schemas.microsoft.com/office/drawing/2014/main" id="{6AF1B24E-7C31-D352-239D-5307CEE5F3BA}"/>
+                <a16:creationId xmlns:a16="http://schemas.microsoft.com/office/drawing/2014/main" xmlns="" id="{6AF1B24E-7C31-D352-239D-5307CEE5F3BA}"/>
               </a:ext>
             </a:extLst>
           </p:cNvPr>
@@ -7436,7 +7444,7 @@
           <p:cNvPr id="3" name="표 3">
             <a:extLst>
               <a:ext uri="{FF2B5EF4-FFF2-40B4-BE49-F238E27FC236}">
-                <a16:creationId xmlns:a16="http://schemas.microsoft.com/office/drawing/2014/main" id="{83E41BCA-5946-F23B-DDB2-A15A43C3D242}"/>
+                <a16:creationId xmlns:a16="http://schemas.microsoft.com/office/drawing/2014/main" xmlns="" id="{83E41BCA-5946-F23B-DDB2-A15A43C3D242}"/>
               </a:ext>
             </a:extLst>
           </p:cNvPr>
@@ -7459,28 +7467,28 @@
                 <a:gridCol w="1143368">
                   <a:extLst>
                     <a:ext uri="{9D8B030D-6E8A-4147-A177-3AD203B41FA5}">
-                      <a16:colId xmlns:a16="http://schemas.microsoft.com/office/drawing/2014/main" val="2009367983"/>
+                      <a16:colId xmlns:a16="http://schemas.microsoft.com/office/drawing/2014/main" xmlns="" val="2009367983"/>
                     </a:ext>
                   </a:extLst>
                 </a:gridCol>
                 <a:gridCol w="3328368">
                   <a:extLst>
                     <a:ext uri="{9D8B030D-6E8A-4147-A177-3AD203B41FA5}">
-                      <a16:colId xmlns:a16="http://schemas.microsoft.com/office/drawing/2014/main" val="3488438301"/>
+                      <a16:colId xmlns:a16="http://schemas.microsoft.com/office/drawing/2014/main" xmlns="" val="3488438301"/>
                     </a:ext>
                   </a:extLst>
                 </a:gridCol>
                 <a:gridCol w="1159043">
                   <a:extLst>
                     <a:ext uri="{9D8B030D-6E8A-4147-A177-3AD203B41FA5}">
-                      <a16:colId xmlns:a16="http://schemas.microsoft.com/office/drawing/2014/main" val="57341383"/>
+                      <a16:colId xmlns:a16="http://schemas.microsoft.com/office/drawing/2014/main" xmlns="" val="57341383"/>
                     </a:ext>
                   </a:extLst>
                 </a:gridCol>
                 <a:gridCol w="3312693">
                   <a:extLst>
                     <a:ext uri="{9D8B030D-6E8A-4147-A177-3AD203B41FA5}">
-                      <a16:colId xmlns:a16="http://schemas.microsoft.com/office/drawing/2014/main" val="3830577718"/>
+                      <a16:colId xmlns:a16="http://schemas.microsoft.com/office/drawing/2014/main" xmlns="" val="3830577718"/>
                     </a:ext>
                   </a:extLst>
                 </a:gridCol>
@@ -7820,7 +7828,7 @@
                 </a:tc>
                 <a:extLst>
                   <a:ext uri="{0D108BD9-81ED-4DB2-BD59-A6C34878D82A}">
-                    <a16:rowId xmlns:a16="http://schemas.microsoft.com/office/drawing/2014/main" val="2378104980"/>
+                    <a16:rowId xmlns:a16="http://schemas.microsoft.com/office/drawing/2014/main" xmlns="" val="2378104980"/>
                   </a:ext>
                 </a:extLst>
               </a:tr>
@@ -7997,7 +8005,7 @@
                 </a:tc>
                 <a:extLst>
                   <a:ext uri="{0D108BD9-81ED-4DB2-BD59-A6C34878D82A}">
-                    <a16:rowId xmlns:a16="http://schemas.microsoft.com/office/drawing/2014/main" val="966726498"/>
+                    <a16:rowId xmlns:a16="http://schemas.microsoft.com/office/drawing/2014/main" xmlns="" val="966726498"/>
                   </a:ext>
                 </a:extLst>
               </a:tr>
@@ -8010,7 +8018,7 @@
           <p:cNvPr id="5" name="그림 4">
             <a:extLst>
               <a:ext uri="{FF2B5EF4-FFF2-40B4-BE49-F238E27FC236}">
-                <a16:creationId xmlns:a16="http://schemas.microsoft.com/office/drawing/2014/main" id="{52BB8E44-C74C-2A6F-F2B9-9B8AA456DF31}"/>
+                <a16:creationId xmlns:a16="http://schemas.microsoft.com/office/drawing/2014/main" xmlns="" id="{52BB8E44-C74C-2A6F-F2B9-9B8AA456DF31}"/>
               </a:ext>
             </a:extLst>
           </p:cNvPr>
@@ -8070,7 +8078,7 @@
           <p:cNvPr id="2" name="바닥글 개체 틀 1">
             <a:extLst>
               <a:ext uri="{FF2B5EF4-FFF2-40B4-BE49-F238E27FC236}">
-                <a16:creationId xmlns:a16="http://schemas.microsoft.com/office/drawing/2014/main" id="{6AF1B24E-7C31-D352-239D-5307CEE5F3BA}"/>
+                <a16:creationId xmlns:a16="http://schemas.microsoft.com/office/drawing/2014/main" xmlns="" id="{6AF1B24E-7C31-D352-239D-5307CEE5F3BA}"/>
               </a:ext>
             </a:extLst>
           </p:cNvPr>
@@ -8100,7 +8108,7 @@
           <p:cNvPr id="3" name="표 3">
             <a:extLst>
               <a:ext uri="{FF2B5EF4-FFF2-40B4-BE49-F238E27FC236}">
-                <a16:creationId xmlns:a16="http://schemas.microsoft.com/office/drawing/2014/main" id="{83E41BCA-5946-F23B-DDB2-A15A43C3D242}"/>
+                <a16:creationId xmlns:a16="http://schemas.microsoft.com/office/drawing/2014/main" xmlns="" id="{83E41BCA-5946-F23B-DDB2-A15A43C3D242}"/>
               </a:ext>
             </a:extLst>
           </p:cNvPr>
@@ -8123,28 +8131,28 @@
                 <a:gridCol w="1143368">
                   <a:extLst>
                     <a:ext uri="{9D8B030D-6E8A-4147-A177-3AD203B41FA5}">
-                      <a16:colId xmlns:a16="http://schemas.microsoft.com/office/drawing/2014/main" val="2009367983"/>
+                      <a16:colId xmlns:a16="http://schemas.microsoft.com/office/drawing/2014/main" xmlns="" val="2009367983"/>
                     </a:ext>
                   </a:extLst>
                 </a:gridCol>
                 <a:gridCol w="3328368">
                   <a:extLst>
                     <a:ext uri="{9D8B030D-6E8A-4147-A177-3AD203B41FA5}">
-                      <a16:colId xmlns:a16="http://schemas.microsoft.com/office/drawing/2014/main" val="3488438301"/>
+                      <a16:colId xmlns:a16="http://schemas.microsoft.com/office/drawing/2014/main" xmlns="" val="3488438301"/>
                     </a:ext>
                   </a:extLst>
                 </a:gridCol>
                 <a:gridCol w="1159043">
                   <a:extLst>
                     <a:ext uri="{9D8B030D-6E8A-4147-A177-3AD203B41FA5}">
-                      <a16:colId xmlns:a16="http://schemas.microsoft.com/office/drawing/2014/main" val="57341383"/>
+                      <a16:colId xmlns:a16="http://schemas.microsoft.com/office/drawing/2014/main" xmlns="" val="57341383"/>
                     </a:ext>
                   </a:extLst>
                 </a:gridCol>
                 <a:gridCol w="3312693">
                   <a:extLst>
                     <a:ext uri="{9D8B030D-6E8A-4147-A177-3AD203B41FA5}">
-                      <a16:colId xmlns:a16="http://schemas.microsoft.com/office/drawing/2014/main" val="3830577718"/>
+                      <a16:colId xmlns:a16="http://schemas.microsoft.com/office/drawing/2014/main" xmlns="" val="3830577718"/>
                     </a:ext>
                   </a:extLst>
                 </a:gridCol>
@@ -8484,7 +8492,7 @@
                 </a:tc>
                 <a:extLst>
                   <a:ext uri="{0D108BD9-81ED-4DB2-BD59-A6C34878D82A}">
-                    <a16:rowId xmlns:a16="http://schemas.microsoft.com/office/drawing/2014/main" val="2378104980"/>
+                    <a16:rowId xmlns:a16="http://schemas.microsoft.com/office/drawing/2014/main" xmlns="" val="2378104980"/>
                   </a:ext>
                 </a:extLst>
               </a:tr>
@@ -8661,7 +8669,7 @@
                 </a:tc>
                 <a:extLst>
                   <a:ext uri="{0D108BD9-81ED-4DB2-BD59-A6C34878D82A}">
-                    <a16:rowId xmlns:a16="http://schemas.microsoft.com/office/drawing/2014/main" val="966726498"/>
+                    <a16:rowId xmlns:a16="http://schemas.microsoft.com/office/drawing/2014/main" xmlns="" val="966726498"/>
                   </a:ext>
                 </a:extLst>
               </a:tr>
@@ -8674,7 +8682,7 @@
           <p:cNvPr id="5" name="그림 4">
             <a:extLst>
               <a:ext uri="{FF2B5EF4-FFF2-40B4-BE49-F238E27FC236}">
-                <a16:creationId xmlns:a16="http://schemas.microsoft.com/office/drawing/2014/main" id="{83058C6B-3E5B-0DB8-3344-D31D963CBDF8}"/>
+                <a16:creationId xmlns:a16="http://schemas.microsoft.com/office/drawing/2014/main" xmlns="" id="{83058C6B-3E5B-0DB8-3344-D31D963CBDF8}"/>
               </a:ext>
             </a:extLst>
           </p:cNvPr>
@@ -8734,7 +8742,7 @@
           <p:cNvPr id="2" name="바닥글 개체 틀 1">
             <a:extLst>
               <a:ext uri="{FF2B5EF4-FFF2-40B4-BE49-F238E27FC236}">
-                <a16:creationId xmlns:a16="http://schemas.microsoft.com/office/drawing/2014/main" id="{6AF1B24E-7C31-D352-239D-5307CEE5F3BA}"/>
+                <a16:creationId xmlns:a16="http://schemas.microsoft.com/office/drawing/2014/main" xmlns="" id="{6AF1B24E-7C31-D352-239D-5307CEE5F3BA}"/>
               </a:ext>
             </a:extLst>
           </p:cNvPr>
@@ -8764,7 +8772,7 @@
           <p:cNvPr id="3" name="표 3">
             <a:extLst>
               <a:ext uri="{FF2B5EF4-FFF2-40B4-BE49-F238E27FC236}">
-                <a16:creationId xmlns:a16="http://schemas.microsoft.com/office/drawing/2014/main" id="{83E41BCA-5946-F23B-DDB2-A15A43C3D242}"/>
+                <a16:creationId xmlns:a16="http://schemas.microsoft.com/office/drawing/2014/main" xmlns="" id="{83E41BCA-5946-F23B-DDB2-A15A43C3D242}"/>
               </a:ext>
             </a:extLst>
           </p:cNvPr>
@@ -8787,28 +8795,28 @@
                 <a:gridCol w="1143368">
                   <a:extLst>
                     <a:ext uri="{9D8B030D-6E8A-4147-A177-3AD203B41FA5}">
-                      <a16:colId xmlns:a16="http://schemas.microsoft.com/office/drawing/2014/main" val="2009367983"/>
+                      <a16:colId xmlns:a16="http://schemas.microsoft.com/office/drawing/2014/main" xmlns="" val="2009367983"/>
                     </a:ext>
                   </a:extLst>
                 </a:gridCol>
                 <a:gridCol w="3328368">
                   <a:extLst>
                     <a:ext uri="{9D8B030D-6E8A-4147-A177-3AD203B41FA5}">
-                      <a16:colId xmlns:a16="http://schemas.microsoft.com/office/drawing/2014/main" val="3488438301"/>
+                      <a16:colId xmlns:a16="http://schemas.microsoft.com/office/drawing/2014/main" xmlns="" val="3488438301"/>
                     </a:ext>
                   </a:extLst>
                 </a:gridCol>
                 <a:gridCol w="1159043">
                   <a:extLst>
                     <a:ext uri="{9D8B030D-6E8A-4147-A177-3AD203B41FA5}">
-                      <a16:colId xmlns:a16="http://schemas.microsoft.com/office/drawing/2014/main" val="57341383"/>
+                      <a16:colId xmlns:a16="http://schemas.microsoft.com/office/drawing/2014/main" xmlns="" val="57341383"/>
                     </a:ext>
                   </a:extLst>
                 </a:gridCol>
                 <a:gridCol w="3312693">
                   <a:extLst>
                     <a:ext uri="{9D8B030D-6E8A-4147-A177-3AD203B41FA5}">
-                      <a16:colId xmlns:a16="http://schemas.microsoft.com/office/drawing/2014/main" val="3830577718"/>
+                      <a16:colId xmlns:a16="http://schemas.microsoft.com/office/drawing/2014/main" xmlns="" val="3830577718"/>
                     </a:ext>
                   </a:extLst>
                 </a:gridCol>
@@ -9148,7 +9156,7 @@
                 </a:tc>
                 <a:extLst>
                   <a:ext uri="{0D108BD9-81ED-4DB2-BD59-A6C34878D82A}">
-                    <a16:rowId xmlns:a16="http://schemas.microsoft.com/office/drawing/2014/main" val="2378104980"/>
+                    <a16:rowId xmlns:a16="http://schemas.microsoft.com/office/drawing/2014/main" xmlns="" val="2378104980"/>
                   </a:ext>
                 </a:extLst>
               </a:tr>
@@ -9325,7 +9333,7 @@
                 </a:tc>
                 <a:extLst>
                   <a:ext uri="{0D108BD9-81ED-4DB2-BD59-A6C34878D82A}">
-                    <a16:rowId xmlns:a16="http://schemas.microsoft.com/office/drawing/2014/main" val="966726498"/>
+                    <a16:rowId xmlns:a16="http://schemas.microsoft.com/office/drawing/2014/main" xmlns="" val="966726498"/>
                   </a:ext>
                 </a:extLst>
               </a:tr>
@@ -9338,7 +9346,7 @@
           <p:cNvPr id="5" name="그림 4">
             <a:extLst>
               <a:ext uri="{FF2B5EF4-FFF2-40B4-BE49-F238E27FC236}">
-                <a16:creationId xmlns:a16="http://schemas.microsoft.com/office/drawing/2014/main" id="{429C19CF-007C-3DD7-4FBA-1E94E70265DE}"/>
+                <a16:creationId xmlns:a16="http://schemas.microsoft.com/office/drawing/2014/main" xmlns="" id="{429C19CF-007C-3DD7-4FBA-1E94E70265DE}"/>
               </a:ext>
             </a:extLst>
           </p:cNvPr>
@@ -9398,7 +9406,7 @@
           <p:cNvPr id="2" name="바닥글 개체 틀 1">
             <a:extLst>
               <a:ext uri="{FF2B5EF4-FFF2-40B4-BE49-F238E27FC236}">
-                <a16:creationId xmlns:a16="http://schemas.microsoft.com/office/drawing/2014/main" id="{6AF1B24E-7C31-D352-239D-5307CEE5F3BA}"/>
+                <a16:creationId xmlns:a16="http://schemas.microsoft.com/office/drawing/2014/main" xmlns="" id="{6AF1B24E-7C31-D352-239D-5307CEE5F3BA}"/>
               </a:ext>
             </a:extLst>
           </p:cNvPr>
@@ -9428,7 +9436,7 @@
           <p:cNvPr id="3" name="표 3">
             <a:extLst>
               <a:ext uri="{FF2B5EF4-FFF2-40B4-BE49-F238E27FC236}">
-                <a16:creationId xmlns:a16="http://schemas.microsoft.com/office/drawing/2014/main" id="{83E41BCA-5946-F23B-DDB2-A15A43C3D242}"/>
+                <a16:creationId xmlns:a16="http://schemas.microsoft.com/office/drawing/2014/main" xmlns="" id="{83E41BCA-5946-F23B-DDB2-A15A43C3D242}"/>
               </a:ext>
             </a:extLst>
           </p:cNvPr>
@@ -9451,28 +9459,28 @@
                 <a:gridCol w="1143368">
                   <a:extLst>
                     <a:ext uri="{9D8B030D-6E8A-4147-A177-3AD203B41FA5}">
-                      <a16:colId xmlns:a16="http://schemas.microsoft.com/office/drawing/2014/main" val="2009367983"/>
+                      <a16:colId xmlns:a16="http://schemas.microsoft.com/office/drawing/2014/main" xmlns="" val="2009367983"/>
                     </a:ext>
                   </a:extLst>
                 </a:gridCol>
                 <a:gridCol w="3328368">
                   <a:extLst>
                     <a:ext uri="{9D8B030D-6E8A-4147-A177-3AD203B41FA5}">
-                      <a16:colId xmlns:a16="http://schemas.microsoft.com/office/drawing/2014/main" val="3488438301"/>
+                      <a16:colId xmlns:a16="http://schemas.microsoft.com/office/drawing/2014/main" xmlns="" val="3488438301"/>
                     </a:ext>
                   </a:extLst>
                 </a:gridCol>
                 <a:gridCol w="1159043">
                   <a:extLst>
                     <a:ext uri="{9D8B030D-6E8A-4147-A177-3AD203B41FA5}">
-                      <a16:colId xmlns:a16="http://schemas.microsoft.com/office/drawing/2014/main" val="57341383"/>
+                      <a16:colId xmlns:a16="http://schemas.microsoft.com/office/drawing/2014/main" xmlns="" val="57341383"/>
                     </a:ext>
                   </a:extLst>
                 </a:gridCol>
                 <a:gridCol w="3312693">
                   <a:extLst>
                     <a:ext uri="{9D8B030D-6E8A-4147-A177-3AD203B41FA5}">
-                      <a16:colId xmlns:a16="http://schemas.microsoft.com/office/drawing/2014/main" val="3830577718"/>
+                      <a16:colId xmlns:a16="http://schemas.microsoft.com/office/drawing/2014/main" xmlns="" val="3830577718"/>
                     </a:ext>
                   </a:extLst>
                 </a:gridCol>
@@ -9812,7 +9820,7 @@
                 </a:tc>
                 <a:extLst>
                   <a:ext uri="{0D108BD9-81ED-4DB2-BD59-A6C34878D82A}">
-                    <a16:rowId xmlns:a16="http://schemas.microsoft.com/office/drawing/2014/main" val="2378104980"/>
+                    <a16:rowId xmlns:a16="http://schemas.microsoft.com/office/drawing/2014/main" xmlns="" val="2378104980"/>
                   </a:ext>
                 </a:extLst>
               </a:tr>
@@ -9989,7 +9997,7 @@
                 </a:tc>
                 <a:extLst>
                   <a:ext uri="{0D108BD9-81ED-4DB2-BD59-A6C34878D82A}">
-                    <a16:rowId xmlns:a16="http://schemas.microsoft.com/office/drawing/2014/main" val="966726498"/>
+                    <a16:rowId xmlns:a16="http://schemas.microsoft.com/office/drawing/2014/main" xmlns="" val="966726498"/>
                   </a:ext>
                 </a:extLst>
               </a:tr>
@@ -10002,7 +10010,7 @@
           <p:cNvPr id="5" name="그림 4">
             <a:extLst>
               <a:ext uri="{FF2B5EF4-FFF2-40B4-BE49-F238E27FC236}">
-                <a16:creationId xmlns:a16="http://schemas.microsoft.com/office/drawing/2014/main" id="{E7A998B6-AFF4-BFD6-0F74-96BA324E03BC}"/>
+                <a16:creationId xmlns:a16="http://schemas.microsoft.com/office/drawing/2014/main" xmlns="" id="{E7A998B6-AFF4-BFD6-0F74-96BA324E03BC}"/>
               </a:ext>
             </a:extLst>
           </p:cNvPr>
@@ -10132,28 +10140,28 @@
                 <a:gridCol w="2145506">
                   <a:extLst>
                     <a:ext uri="{9D8B030D-6E8A-4147-A177-3AD203B41FA5}">
-                      <a16:colId xmlns:a16="http://schemas.microsoft.com/office/drawing/2014/main" val="20000"/>
+                      <a16:colId xmlns:a16="http://schemas.microsoft.com/office/drawing/2014/main" xmlns="" val="20000"/>
                     </a:ext>
                   </a:extLst>
                 </a:gridCol>
                 <a:gridCol w="2145506">
                   <a:extLst>
                     <a:ext uri="{9D8B030D-6E8A-4147-A177-3AD203B41FA5}">
-                      <a16:colId xmlns:a16="http://schemas.microsoft.com/office/drawing/2014/main" val="20001"/>
+                      <a16:colId xmlns:a16="http://schemas.microsoft.com/office/drawing/2014/main" xmlns="" val="20001"/>
                     </a:ext>
                   </a:extLst>
                 </a:gridCol>
                 <a:gridCol w="2145506">
                   <a:extLst>
                     <a:ext uri="{9D8B030D-6E8A-4147-A177-3AD203B41FA5}">
-                      <a16:colId xmlns:a16="http://schemas.microsoft.com/office/drawing/2014/main" val="20002"/>
+                      <a16:colId xmlns:a16="http://schemas.microsoft.com/office/drawing/2014/main" xmlns="" val="20002"/>
                     </a:ext>
                   </a:extLst>
                 </a:gridCol>
                 <a:gridCol w="2145506">
                   <a:extLst>
                     <a:ext uri="{9D8B030D-6E8A-4147-A177-3AD203B41FA5}">
-                      <a16:colId xmlns:a16="http://schemas.microsoft.com/office/drawing/2014/main" val="20003"/>
+                      <a16:colId xmlns:a16="http://schemas.microsoft.com/office/drawing/2014/main" xmlns="" val="20003"/>
                     </a:ext>
                   </a:extLst>
                 </a:gridCol>
@@ -10281,7 +10289,7 @@
                 </a:tc>
                 <a:extLst>
                   <a:ext uri="{0D108BD9-81ED-4DB2-BD59-A6C34878D82A}">
-                    <a16:rowId xmlns:a16="http://schemas.microsoft.com/office/drawing/2014/main" val="10000"/>
+                    <a16:rowId xmlns:a16="http://schemas.microsoft.com/office/drawing/2014/main" xmlns="" val="10000"/>
                   </a:ext>
                 </a:extLst>
               </a:tr>
@@ -10398,7 +10406,7 @@
                 </a:tc>
                 <a:extLst>
                   <a:ext uri="{0D108BD9-81ED-4DB2-BD59-A6C34878D82A}">
-                    <a16:rowId xmlns:a16="http://schemas.microsoft.com/office/drawing/2014/main" val="10001"/>
+                    <a16:rowId xmlns:a16="http://schemas.microsoft.com/office/drawing/2014/main" xmlns="" val="10001"/>
                   </a:ext>
                 </a:extLst>
               </a:tr>
@@ -10535,7 +10543,7 @@
                 </a:tc>
                 <a:extLst>
                   <a:ext uri="{0D108BD9-81ED-4DB2-BD59-A6C34878D82A}">
-                    <a16:rowId xmlns:a16="http://schemas.microsoft.com/office/drawing/2014/main" val="10002"/>
+                    <a16:rowId xmlns:a16="http://schemas.microsoft.com/office/drawing/2014/main" xmlns="" val="10002"/>
                   </a:ext>
                 </a:extLst>
               </a:tr>
@@ -10626,7 +10634,7 @@
                 </a:tc>
                 <a:extLst>
                   <a:ext uri="{0D108BD9-81ED-4DB2-BD59-A6C34878D82A}">
-                    <a16:rowId xmlns:a16="http://schemas.microsoft.com/office/drawing/2014/main" val="10003"/>
+                    <a16:rowId xmlns:a16="http://schemas.microsoft.com/office/drawing/2014/main" xmlns="" val="10003"/>
                   </a:ext>
                 </a:extLst>
               </a:tr>
@@ -10717,7 +10725,7 @@
                 </a:tc>
                 <a:extLst>
                   <a:ext uri="{0D108BD9-81ED-4DB2-BD59-A6C34878D82A}">
-                    <a16:rowId xmlns:a16="http://schemas.microsoft.com/office/drawing/2014/main" val="10004"/>
+                    <a16:rowId xmlns:a16="http://schemas.microsoft.com/office/drawing/2014/main" xmlns="" val="10004"/>
                   </a:ext>
                 </a:extLst>
               </a:tr>
@@ -10808,7 +10816,7 @@
                 </a:tc>
                 <a:extLst>
                   <a:ext uri="{0D108BD9-81ED-4DB2-BD59-A6C34878D82A}">
-                    <a16:rowId xmlns:a16="http://schemas.microsoft.com/office/drawing/2014/main" val="10005"/>
+                    <a16:rowId xmlns:a16="http://schemas.microsoft.com/office/drawing/2014/main" xmlns="" val="10005"/>
                   </a:ext>
                 </a:extLst>
               </a:tr>
@@ -10899,7 +10907,7 @@
                 </a:tc>
                 <a:extLst>
                   <a:ext uri="{0D108BD9-81ED-4DB2-BD59-A6C34878D82A}">
-                    <a16:rowId xmlns:a16="http://schemas.microsoft.com/office/drawing/2014/main" val="10006"/>
+                    <a16:rowId xmlns:a16="http://schemas.microsoft.com/office/drawing/2014/main" xmlns="" val="10006"/>
                   </a:ext>
                 </a:extLst>
               </a:tr>
@@ -10990,7 +10998,7 @@
                 </a:tc>
                 <a:extLst>
                   <a:ext uri="{0D108BD9-81ED-4DB2-BD59-A6C34878D82A}">
-                    <a16:rowId xmlns:a16="http://schemas.microsoft.com/office/drawing/2014/main" val="10007"/>
+                    <a16:rowId xmlns:a16="http://schemas.microsoft.com/office/drawing/2014/main" xmlns="" val="10007"/>
                   </a:ext>
                 </a:extLst>
               </a:tr>
@@ -11028,7 +11036,7 @@
           <p:cNvPr id="2" name="바닥글 개체 틀 1">
             <a:extLst>
               <a:ext uri="{FF2B5EF4-FFF2-40B4-BE49-F238E27FC236}">
-                <a16:creationId xmlns:a16="http://schemas.microsoft.com/office/drawing/2014/main" id="{6AF1B24E-7C31-D352-239D-5307CEE5F3BA}"/>
+                <a16:creationId xmlns:a16="http://schemas.microsoft.com/office/drawing/2014/main" xmlns="" id="{6AF1B24E-7C31-D352-239D-5307CEE5F3BA}"/>
               </a:ext>
             </a:extLst>
           </p:cNvPr>
@@ -11058,7 +11066,7 @@
           <p:cNvPr id="3" name="표 3">
             <a:extLst>
               <a:ext uri="{FF2B5EF4-FFF2-40B4-BE49-F238E27FC236}">
-                <a16:creationId xmlns:a16="http://schemas.microsoft.com/office/drawing/2014/main" id="{83E41BCA-5946-F23B-DDB2-A15A43C3D242}"/>
+                <a16:creationId xmlns:a16="http://schemas.microsoft.com/office/drawing/2014/main" xmlns="" id="{83E41BCA-5946-F23B-DDB2-A15A43C3D242}"/>
               </a:ext>
             </a:extLst>
           </p:cNvPr>
@@ -11081,28 +11089,28 @@
                 <a:gridCol w="1143368">
                   <a:extLst>
                     <a:ext uri="{9D8B030D-6E8A-4147-A177-3AD203B41FA5}">
-                      <a16:colId xmlns:a16="http://schemas.microsoft.com/office/drawing/2014/main" val="2009367983"/>
+                      <a16:colId xmlns:a16="http://schemas.microsoft.com/office/drawing/2014/main" xmlns="" val="2009367983"/>
                     </a:ext>
                   </a:extLst>
                 </a:gridCol>
                 <a:gridCol w="3328368">
                   <a:extLst>
                     <a:ext uri="{9D8B030D-6E8A-4147-A177-3AD203B41FA5}">
-                      <a16:colId xmlns:a16="http://schemas.microsoft.com/office/drawing/2014/main" val="3488438301"/>
+                      <a16:colId xmlns:a16="http://schemas.microsoft.com/office/drawing/2014/main" xmlns="" val="3488438301"/>
                     </a:ext>
                   </a:extLst>
                 </a:gridCol>
                 <a:gridCol w="1159043">
                   <a:extLst>
                     <a:ext uri="{9D8B030D-6E8A-4147-A177-3AD203B41FA5}">
-                      <a16:colId xmlns:a16="http://schemas.microsoft.com/office/drawing/2014/main" val="57341383"/>
+                      <a16:colId xmlns:a16="http://schemas.microsoft.com/office/drawing/2014/main" xmlns="" val="57341383"/>
                     </a:ext>
                   </a:extLst>
                 </a:gridCol>
                 <a:gridCol w="3312693">
                   <a:extLst>
                     <a:ext uri="{9D8B030D-6E8A-4147-A177-3AD203B41FA5}">
-                      <a16:colId xmlns:a16="http://schemas.microsoft.com/office/drawing/2014/main" val="3830577718"/>
+                      <a16:colId xmlns:a16="http://schemas.microsoft.com/office/drawing/2014/main" xmlns="" val="3830577718"/>
                     </a:ext>
                   </a:extLst>
                 </a:gridCol>
@@ -11442,7 +11450,7 @@
                 </a:tc>
                 <a:extLst>
                   <a:ext uri="{0D108BD9-81ED-4DB2-BD59-A6C34878D82A}">
-                    <a16:rowId xmlns:a16="http://schemas.microsoft.com/office/drawing/2014/main" val="2378104980"/>
+                    <a16:rowId xmlns:a16="http://schemas.microsoft.com/office/drawing/2014/main" xmlns="" val="2378104980"/>
                   </a:ext>
                 </a:extLst>
               </a:tr>
@@ -11619,7 +11627,7 @@
                 </a:tc>
                 <a:extLst>
                   <a:ext uri="{0D108BD9-81ED-4DB2-BD59-A6C34878D82A}">
-                    <a16:rowId xmlns:a16="http://schemas.microsoft.com/office/drawing/2014/main" val="966726498"/>
+                    <a16:rowId xmlns:a16="http://schemas.microsoft.com/office/drawing/2014/main" xmlns="" val="966726498"/>
                   </a:ext>
                 </a:extLst>
               </a:tr>
@@ -11632,7 +11640,7 @@
           <p:cNvPr id="5" name="그림 4">
             <a:extLst>
               <a:ext uri="{FF2B5EF4-FFF2-40B4-BE49-F238E27FC236}">
-                <a16:creationId xmlns:a16="http://schemas.microsoft.com/office/drawing/2014/main" id="{93D3B63B-2FA2-CD4B-370A-C0D018E795D9}"/>
+                <a16:creationId xmlns:a16="http://schemas.microsoft.com/office/drawing/2014/main" xmlns="" id="{93D3B63B-2FA2-CD4B-370A-C0D018E795D9}"/>
               </a:ext>
             </a:extLst>
           </p:cNvPr>
@@ -11692,7 +11700,7 @@
           <p:cNvPr id="2" name="바닥글 개체 틀 1">
             <a:extLst>
               <a:ext uri="{FF2B5EF4-FFF2-40B4-BE49-F238E27FC236}">
-                <a16:creationId xmlns:a16="http://schemas.microsoft.com/office/drawing/2014/main" id="{6AF1B24E-7C31-D352-239D-5307CEE5F3BA}"/>
+                <a16:creationId xmlns:a16="http://schemas.microsoft.com/office/drawing/2014/main" xmlns="" id="{6AF1B24E-7C31-D352-239D-5307CEE5F3BA}"/>
               </a:ext>
             </a:extLst>
           </p:cNvPr>
@@ -11722,7 +11730,7 @@
           <p:cNvPr id="3" name="표 3">
             <a:extLst>
               <a:ext uri="{FF2B5EF4-FFF2-40B4-BE49-F238E27FC236}">
-                <a16:creationId xmlns:a16="http://schemas.microsoft.com/office/drawing/2014/main" id="{83E41BCA-5946-F23B-DDB2-A15A43C3D242}"/>
+                <a16:creationId xmlns:a16="http://schemas.microsoft.com/office/drawing/2014/main" xmlns="" id="{83E41BCA-5946-F23B-DDB2-A15A43C3D242}"/>
               </a:ext>
             </a:extLst>
           </p:cNvPr>
@@ -11745,28 +11753,28 @@
                 <a:gridCol w="1143368">
                   <a:extLst>
                     <a:ext uri="{9D8B030D-6E8A-4147-A177-3AD203B41FA5}">
-                      <a16:colId xmlns:a16="http://schemas.microsoft.com/office/drawing/2014/main" val="2009367983"/>
+                      <a16:colId xmlns:a16="http://schemas.microsoft.com/office/drawing/2014/main" xmlns="" val="2009367983"/>
                     </a:ext>
                   </a:extLst>
                 </a:gridCol>
                 <a:gridCol w="3328368">
                   <a:extLst>
                     <a:ext uri="{9D8B030D-6E8A-4147-A177-3AD203B41FA5}">
-                      <a16:colId xmlns:a16="http://schemas.microsoft.com/office/drawing/2014/main" val="3488438301"/>
+                      <a16:colId xmlns:a16="http://schemas.microsoft.com/office/drawing/2014/main" xmlns="" val="3488438301"/>
                     </a:ext>
                   </a:extLst>
                 </a:gridCol>
                 <a:gridCol w="1159043">
                   <a:extLst>
                     <a:ext uri="{9D8B030D-6E8A-4147-A177-3AD203B41FA5}">
-                      <a16:colId xmlns:a16="http://schemas.microsoft.com/office/drawing/2014/main" val="57341383"/>
+                      <a16:colId xmlns:a16="http://schemas.microsoft.com/office/drawing/2014/main" xmlns="" val="57341383"/>
                     </a:ext>
                   </a:extLst>
                 </a:gridCol>
                 <a:gridCol w="3312693">
                   <a:extLst>
                     <a:ext uri="{9D8B030D-6E8A-4147-A177-3AD203B41FA5}">
-                      <a16:colId xmlns:a16="http://schemas.microsoft.com/office/drawing/2014/main" val="3830577718"/>
+                      <a16:colId xmlns:a16="http://schemas.microsoft.com/office/drawing/2014/main" xmlns="" val="3830577718"/>
                     </a:ext>
                   </a:extLst>
                 </a:gridCol>
@@ -12106,7 +12114,7 @@
                 </a:tc>
                 <a:extLst>
                   <a:ext uri="{0D108BD9-81ED-4DB2-BD59-A6C34878D82A}">
-                    <a16:rowId xmlns:a16="http://schemas.microsoft.com/office/drawing/2014/main" val="2378104980"/>
+                    <a16:rowId xmlns:a16="http://schemas.microsoft.com/office/drawing/2014/main" xmlns="" val="2378104980"/>
                   </a:ext>
                 </a:extLst>
               </a:tr>
@@ -12283,7 +12291,7 @@
                 </a:tc>
                 <a:extLst>
                   <a:ext uri="{0D108BD9-81ED-4DB2-BD59-A6C34878D82A}">
-                    <a16:rowId xmlns:a16="http://schemas.microsoft.com/office/drawing/2014/main" val="966726498"/>
+                    <a16:rowId xmlns:a16="http://schemas.microsoft.com/office/drawing/2014/main" xmlns="" val="966726498"/>
                   </a:ext>
                 </a:extLst>
               </a:tr>
@@ -12293,15 +12301,9 @@
       </p:graphicFrame>
       <p:pic>
         <p:nvPicPr>
-          <p:cNvPr id="5" name="그림 4">
-            <a:extLst>
-              <a:ext uri="{FF2B5EF4-FFF2-40B4-BE49-F238E27FC236}">
-                <a16:creationId xmlns:a16="http://schemas.microsoft.com/office/drawing/2014/main" id="{5BB231D7-462C-2771-5DB0-4CFF33AAA418}"/>
-              </a:ext>
-            </a:extLst>
-          </p:cNvPr>
+          <p:cNvPr id="1026" name="Picture 2" descr="C:\Users\user1\Desktop\0.png"/>
           <p:cNvPicPr>
-            <a:picLocks noChangeAspect="1"/>
+            <a:picLocks noChangeAspect="1" noChangeArrowheads="1"/>
           </p:cNvPicPr>
           <p:nvPr/>
         </p:nvPicPr>
@@ -12313,18 +12315,29 @@
               </a:ext>
             </a:extLst>
           </a:blip>
+          <a:srcRect/>
           <a:stretch>
             <a:fillRect/>
           </a:stretch>
         </p:blipFill>
-        <p:spPr>
+        <p:spPr bwMode="auto">
           <a:xfrm>
-            <a:off x="624656" y="945647"/>
-            <a:ext cx="7894687" cy="5360152"/>
+            <a:off x="384175" y="969963"/>
+            <a:ext cx="8193088" cy="5086350"/>
           </a:xfrm>
           <a:prstGeom prst="rect">
             <a:avLst/>
           </a:prstGeom>
+          <a:noFill/>
+          <a:extLst>
+            <a:ext uri="{909E8E84-426E-40DD-AFC4-6F175D3DCCD1}">
+              <a14:hiddenFill xmlns:a14="http://schemas.microsoft.com/office/drawing/2010/main">
+                <a:solidFill>
+                  <a:srgbClr val="FFFFFF"/>
+                </a:solidFill>
+              </a14:hiddenFill>
+            </a:ext>
+          </a:extLst>
         </p:spPr>
       </p:pic>
     </p:spTree>
@@ -12362,7 +12375,7 @@
           <p:cNvPr id="2" name="바닥글 개체 틀 1">
             <a:extLst>
               <a:ext uri="{FF2B5EF4-FFF2-40B4-BE49-F238E27FC236}">
-                <a16:creationId xmlns:a16="http://schemas.microsoft.com/office/drawing/2014/main" id="{6AF1B24E-7C31-D352-239D-5307CEE5F3BA}"/>
+                <a16:creationId xmlns:a16="http://schemas.microsoft.com/office/drawing/2014/main" xmlns="" id="{6AF1B24E-7C31-D352-239D-5307CEE5F3BA}"/>
               </a:ext>
             </a:extLst>
           </p:cNvPr>
@@ -12392,7 +12405,7 @@
           <p:cNvPr id="3" name="표 3">
             <a:extLst>
               <a:ext uri="{FF2B5EF4-FFF2-40B4-BE49-F238E27FC236}">
-                <a16:creationId xmlns:a16="http://schemas.microsoft.com/office/drawing/2014/main" id="{83E41BCA-5946-F23B-DDB2-A15A43C3D242}"/>
+                <a16:creationId xmlns:a16="http://schemas.microsoft.com/office/drawing/2014/main" xmlns="" id="{83E41BCA-5946-F23B-DDB2-A15A43C3D242}"/>
               </a:ext>
             </a:extLst>
           </p:cNvPr>
@@ -12415,28 +12428,28 @@
                 <a:gridCol w="1143368">
                   <a:extLst>
                     <a:ext uri="{9D8B030D-6E8A-4147-A177-3AD203B41FA5}">
-                      <a16:colId xmlns:a16="http://schemas.microsoft.com/office/drawing/2014/main" val="2009367983"/>
+                      <a16:colId xmlns:a16="http://schemas.microsoft.com/office/drawing/2014/main" xmlns="" val="2009367983"/>
                     </a:ext>
                   </a:extLst>
                 </a:gridCol>
                 <a:gridCol w="3328368">
                   <a:extLst>
                     <a:ext uri="{9D8B030D-6E8A-4147-A177-3AD203B41FA5}">
-                      <a16:colId xmlns:a16="http://schemas.microsoft.com/office/drawing/2014/main" val="3488438301"/>
+                      <a16:colId xmlns:a16="http://schemas.microsoft.com/office/drawing/2014/main" xmlns="" val="3488438301"/>
                     </a:ext>
                   </a:extLst>
                 </a:gridCol>
                 <a:gridCol w="1159043">
                   <a:extLst>
                     <a:ext uri="{9D8B030D-6E8A-4147-A177-3AD203B41FA5}">
-                      <a16:colId xmlns:a16="http://schemas.microsoft.com/office/drawing/2014/main" val="57341383"/>
+                      <a16:colId xmlns:a16="http://schemas.microsoft.com/office/drawing/2014/main" xmlns="" val="57341383"/>
                     </a:ext>
                   </a:extLst>
                 </a:gridCol>
                 <a:gridCol w="3312693">
                   <a:extLst>
                     <a:ext uri="{9D8B030D-6E8A-4147-A177-3AD203B41FA5}">
-                      <a16:colId xmlns:a16="http://schemas.microsoft.com/office/drawing/2014/main" val="3830577718"/>
+                      <a16:colId xmlns:a16="http://schemas.microsoft.com/office/drawing/2014/main" xmlns="" val="3830577718"/>
                     </a:ext>
                   </a:extLst>
                 </a:gridCol>
@@ -12776,7 +12789,7 @@
                 </a:tc>
                 <a:extLst>
                   <a:ext uri="{0D108BD9-81ED-4DB2-BD59-A6C34878D82A}">
-                    <a16:rowId xmlns:a16="http://schemas.microsoft.com/office/drawing/2014/main" val="2378104980"/>
+                    <a16:rowId xmlns:a16="http://schemas.microsoft.com/office/drawing/2014/main" xmlns="" val="2378104980"/>
                   </a:ext>
                 </a:extLst>
               </a:tr>
@@ -12953,7 +12966,7 @@
                 </a:tc>
                 <a:extLst>
                   <a:ext uri="{0D108BD9-81ED-4DB2-BD59-A6C34878D82A}">
-                    <a16:rowId xmlns:a16="http://schemas.microsoft.com/office/drawing/2014/main" val="966726498"/>
+                    <a16:rowId xmlns:a16="http://schemas.microsoft.com/office/drawing/2014/main" xmlns="" val="966726498"/>
                   </a:ext>
                 </a:extLst>
               </a:tr>
@@ -12963,15 +12976,9 @@
       </p:graphicFrame>
       <p:pic>
         <p:nvPicPr>
-          <p:cNvPr id="5" name="그림 4">
-            <a:extLst>
-              <a:ext uri="{FF2B5EF4-FFF2-40B4-BE49-F238E27FC236}">
-                <a16:creationId xmlns:a16="http://schemas.microsoft.com/office/drawing/2014/main" id="{BB2F229B-17F4-53F4-D82B-83AF3C88CC65}"/>
-              </a:ext>
-            </a:extLst>
-          </p:cNvPr>
+          <p:cNvPr id="2050" name="Picture 2" descr="C:\Users\user1\Desktop\1.png"/>
           <p:cNvPicPr>
-            <a:picLocks noChangeAspect="1"/>
+            <a:picLocks noChangeAspect="1" noChangeArrowheads="1"/>
           </p:cNvPicPr>
           <p:nvPr/>
         </p:nvPicPr>
@@ -12983,18 +12990,29 @@
               </a:ext>
             </a:extLst>
           </a:blip>
+          <a:srcRect/>
           <a:stretch>
             <a:fillRect/>
           </a:stretch>
         </p:blipFill>
-        <p:spPr>
+        <p:spPr bwMode="auto">
           <a:xfrm>
-            <a:off x="462844" y="1175896"/>
-            <a:ext cx="8218311" cy="5078201"/>
+            <a:off x="479743" y="1038225"/>
+            <a:ext cx="8278812" cy="5086350"/>
           </a:xfrm>
           <a:prstGeom prst="rect">
             <a:avLst/>
           </a:prstGeom>
+          <a:noFill/>
+          <a:extLst>
+            <a:ext uri="{909E8E84-426E-40DD-AFC4-6F175D3DCCD1}">
+              <a14:hiddenFill xmlns:a14="http://schemas.microsoft.com/office/drawing/2010/main">
+                <a:solidFill>
+                  <a:srgbClr val="FFFFFF"/>
+                </a:solidFill>
+              </a14:hiddenFill>
+            </a:ext>
+          </a:extLst>
         </p:spPr>
       </p:pic>
     </p:spTree>
@@ -13032,7 +13050,7 @@
           <p:cNvPr id="2" name="바닥글 개체 틀 1">
             <a:extLst>
               <a:ext uri="{FF2B5EF4-FFF2-40B4-BE49-F238E27FC236}">
-                <a16:creationId xmlns:a16="http://schemas.microsoft.com/office/drawing/2014/main" id="{6AF1B24E-7C31-D352-239D-5307CEE5F3BA}"/>
+                <a16:creationId xmlns:a16="http://schemas.microsoft.com/office/drawing/2014/main" xmlns="" id="{6AF1B24E-7C31-D352-239D-5307CEE5F3BA}"/>
               </a:ext>
             </a:extLst>
           </p:cNvPr>
@@ -13062,7 +13080,7 @@
           <p:cNvPr id="3" name="표 3">
             <a:extLst>
               <a:ext uri="{FF2B5EF4-FFF2-40B4-BE49-F238E27FC236}">
-                <a16:creationId xmlns:a16="http://schemas.microsoft.com/office/drawing/2014/main" id="{83E41BCA-5946-F23B-DDB2-A15A43C3D242}"/>
+                <a16:creationId xmlns:a16="http://schemas.microsoft.com/office/drawing/2014/main" xmlns="" id="{83E41BCA-5946-F23B-DDB2-A15A43C3D242}"/>
               </a:ext>
             </a:extLst>
           </p:cNvPr>
@@ -13085,28 +13103,28 @@
                 <a:gridCol w="1143368">
                   <a:extLst>
                     <a:ext uri="{9D8B030D-6E8A-4147-A177-3AD203B41FA5}">
-                      <a16:colId xmlns:a16="http://schemas.microsoft.com/office/drawing/2014/main" val="2009367983"/>
+                      <a16:colId xmlns:a16="http://schemas.microsoft.com/office/drawing/2014/main" xmlns="" val="2009367983"/>
                     </a:ext>
                   </a:extLst>
                 </a:gridCol>
                 <a:gridCol w="3328368">
                   <a:extLst>
                     <a:ext uri="{9D8B030D-6E8A-4147-A177-3AD203B41FA5}">
-                      <a16:colId xmlns:a16="http://schemas.microsoft.com/office/drawing/2014/main" val="3488438301"/>
+                      <a16:colId xmlns:a16="http://schemas.microsoft.com/office/drawing/2014/main" xmlns="" val="3488438301"/>
                     </a:ext>
                   </a:extLst>
                 </a:gridCol>
                 <a:gridCol w="1159043">
                   <a:extLst>
                     <a:ext uri="{9D8B030D-6E8A-4147-A177-3AD203B41FA5}">
-                      <a16:colId xmlns:a16="http://schemas.microsoft.com/office/drawing/2014/main" val="57341383"/>
+                      <a16:colId xmlns:a16="http://schemas.microsoft.com/office/drawing/2014/main" xmlns="" val="57341383"/>
                     </a:ext>
                   </a:extLst>
                 </a:gridCol>
                 <a:gridCol w="3312693">
                   <a:extLst>
                     <a:ext uri="{9D8B030D-6E8A-4147-A177-3AD203B41FA5}">
-                      <a16:colId xmlns:a16="http://schemas.microsoft.com/office/drawing/2014/main" val="3830577718"/>
+                      <a16:colId xmlns:a16="http://schemas.microsoft.com/office/drawing/2014/main" xmlns="" val="3830577718"/>
                     </a:ext>
                   </a:extLst>
                 </a:gridCol>
@@ -13446,7 +13464,7 @@
                 </a:tc>
                 <a:extLst>
                   <a:ext uri="{0D108BD9-81ED-4DB2-BD59-A6C34878D82A}">
-                    <a16:rowId xmlns:a16="http://schemas.microsoft.com/office/drawing/2014/main" val="2378104980"/>
+                    <a16:rowId xmlns:a16="http://schemas.microsoft.com/office/drawing/2014/main" xmlns="" val="2378104980"/>
                   </a:ext>
                 </a:extLst>
               </a:tr>
@@ -13623,7 +13641,7 @@
                 </a:tc>
                 <a:extLst>
                   <a:ext uri="{0D108BD9-81ED-4DB2-BD59-A6C34878D82A}">
-                    <a16:rowId xmlns:a16="http://schemas.microsoft.com/office/drawing/2014/main" val="966726498"/>
+                    <a16:rowId xmlns:a16="http://schemas.microsoft.com/office/drawing/2014/main" xmlns="" val="966726498"/>
                   </a:ext>
                 </a:extLst>
               </a:tr>
@@ -13633,15 +13651,9 @@
       </p:graphicFrame>
       <p:pic>
         <p:nvPicPr>
-          <p:cNvPr id="5" name="그림 4">
-            <a:extLst>
-              <a:ext uri="{FF2B5EF4-FFF2-40B4-BE49-F238E27FC236}">
-                <a16:creationId xmlns:a16="http://schemas.microsoft.com/office/drawing/2014/main" id="{3698DF49-1398-79D2-EB78-0E8E3A72D8AC}"/>
-              </a:ext>
-            </a:extLst>
-          </p:cNvPr>
+          <p:cNvPr id="3074" name="Picture 2" descr="C:\Users\user1\Desktop\2.png"/>
           <p:cNvPicPr>
-            <a:picLocks noChangeAspect="1"/>
+            <a:picLocks noChangeAspect="1" noChangeArrowheads="1"/>
           </p:cNvPicPr>
           <p:nvPr/>
         </p:nvPicPr>
@@ -13653,18 +13665,29 @@
               </a:ext>
             </a:extLst>
           </a:blip>
+          <a:srcRect/>
           <a:stretch>
             <a:fillRect/>
           </a:stretch>
         </p:blipFill>
-        <p:spPr>
+        <p:spPr bwMode="auto">
           <a:xfrm>
-            <a:off x="573785" y="911344"/>
-            <a:ext cx="7996429" cy="5371593"/>
+            <a:off x="246062" y="1160145"/>
+            <a:ext cx="8614446" cy="4747279"/>
           </a:xfrm>
           <a:prstGeom prst="rect">
             <a:avLst/>
           </a:prstGeom>
+          <a:noFill/>
+          <a:extLst>
+            <a:ext uri="{909E8E84-426E-40DD-AFC4-6F175D3DCCD1}">
+              <a14:hiddenFill xmlns:a14="http://schemas.microsoft.com/office/drawing/2010/main">
+                <a:solidFill>
+                  <a:srgbClr val="FFFFFF"/>
+                </a:solidFill>
+              </a14:hiddenFill>
+            </a:ext>
+          </a:extLst>
         </p:spPr>
       </p:pic>
     </p:spTree>
@@ -13702,7 +13725,7 @@
           <p:cNvPr id="2" name="바닥글 개체 틀 1">
             <a:extLst>
               <a:ext uri="{FF2B5EF4-FFF2-40B4-BE49-F238E27FC236}">
-                <a16:creationId xmlns:a16="http://schemas.microsoft.com/office/drawing/2014/main" id="{6AF1B24E-7C31-D352-239D-5307CEE5F3BA}"/>
+                <a16:creationId xmlns:a16="http://schemas.microsoft.com/office/drawing/2014/main" xmlns="" id="{6AF1B24E-7C31-D352-239D-5307CEE5F3BA}"/>
               </a:ext>
             </a:extLst>
           </p:cNvPr>
@@ -13732,7 +13755,7 @@
           <p:cNvPr id="3" name="표 3">
             <a:extLst>
               <a:ext uri="{FF2B5EF4-FFF2-40B4-BE49-F238E27FC236}">
-                <a16:creationId xmlns:a16="http://schemas.microsoft.com/office/drawing/2014/main" id="{83E41BCA-5946-F23B-DDB2-A15A43C3D242}"/>
+                <a16:creationId xmlns:a16="http://schemas.microsoft.com/office/drawing/2014/main" xmlns="" id="{83E41BCA-5946-F23B-DDB2-A15A43C3D242}"/>
               </a:ext>
             </a:extLst>
           </p:cNvPr>
@@ -13755,28 +13778,28 @@
                 <a:gridCol w="1143368">
                   <a:extLst>
                     <a:ext uri="{9D8B030D-6E8A-4147-A177-3AD203B41FA5}">
-                      <a16:colId xmlns:a16="http://schemas.microsoft.com/office/drawing/2014/main" val="2009367983"/>
+                      <a16:colId xmlns:a16="http://schemas.microsoft.com/office/drawing/2014/main" xmlns="" val="2009367983"/>
                     </a:ext>
                   </a:extLst>
                 </a:gridCol>
                 <a:gridCol w="3328368">
                   <a:extLst>
                     <a:ext uri="{9D8B030D-6E8A-4147-A177-3AD203B41FA5}">
-                      <a16:colId xmlns:a16="http://schemas.microsoft.com/office/drawing/2014/main" val="3488438301"/>
+                      <a16:colId xmlns:a16="http://schemas.microsoft.com/office/drawing/2014/main" xmlns="" val="3488438301"/>
                     </a:ext>
                   </a:extLst>
                 </a:gridCol>
                 <a:gridCol w="1159043">
                   <a:extLst>
                     <a:ext uri="{9D8B030D-6E8A-4147-A177-3AD203B41FA5}">
-                      <a16:colId xmlns:a16="http://schemas.microsoft.com/office/drawing/2014/main" val="57341383"/>
+                      <a16:colId xmlns:a16="http://schemas.microsoft.com/office/drawing/2014/main" xmlns="" val="57341383"/>
                     </a:ext>
                   </a:extLst>
                 </a:gridCol>
                 <a:gridCol w="3312693">
                   <a:extLst>
                     <a:ext uri="{9D8B030D-6E8A-4147-A177-3AD203B41FA5}">
-                      <a16:colId xmlns:a16="http://schemas.microsoft.com/office/drawing/2014/main" val="3830577718"/>
+                      <a16:colId xmlns:a16="http://schemas.microsoft.com/office/drawing/2014/main" xmlns="" val="3830577718"/>
                     </a:ext>
                   </a:extLst>
                 </a:gridCol>
@@ -14116,7 +14139,7 @@
                 </a:tc>
                 <a:extLst>
                   <a:ext uri="{0D108BD9-81ED-4DB2-BD59-A6C34878D82A}">
-                    <a16:rowId xmlns:a16="http://schemas.microsoft.com/office/drawing/2014/main" val="2378104980"/>
+                    <a16:rowId xmlns:a16="http://schemas.microsoft.com/office/drawing/2014/main" xmlns="" val="2378104980"/>
                   </a:ext>
                 </a:extLst>
               </a:tr>
@@ -14293,7 +14316,7 @@
                 </a:tc>
                 <a:extLst>
                   <a:ext uri="{0D108BD9-81ED-4DB2-BD59-A6C34878D82A}">
-                    <a16:rowId xmlns:a16="http://schemas.microsoft.com/office/drawing/2014/main" val="966726498"/>
+                    <a16:rowId xmlns:a16="http://schemas.microsoft.com/office/drawing/2014/main" xmlns="" val="966726498"/>
                   </a:ext>
                 </a:extLst>
               </a:tr>
@@ -14303,15 +14326,9 @@
       </p:graphicFrame>
       <p:pic>
         <p:nvPicPr>
-          <p:cNvPr id="5" name="그림 4">
-            <a:extLst>
-              <a:ext uri="{FF2B5EF4-FFF2-40B4-BE49-F238E27FC236}">
-                <a16:creationId xmlns:a16="http://schemas.microsoft.com/office/drawing/2014/main" id="{4AD52969-C3B0-9F16-0347-B5B9B173E817}"/>
-              </a:ext>
-            </a:extLst>
-          </p:cNvPr>
+          <p:cNvPr id="4098" name="Picture 2" descr="C:\Users\user1\Desktop\3.png"/>
           <p:cNvPicPr>
-            <a:picLocks noChangeAspect="1"/>
+            <a:picLocks noChangeAspect="1" noChangeArrowheads="1"/>
           </p:cNvPicPr>
           <p:nvPr/>
         </p:nvPicPr>
@@ -14323,18 +14340,29 @@
               </a:ext>
             </a:extLst>
           </a:blip>
+          <a:srcRect/>
           <a:stretch>
             <a:fillRect/>
           </a:stretch>
         </p:blipFill>
-        <p:spPr>
+        <p:spPr bwMode="auto">
           <a:xfrm>
-            <a:off x="330901" y="1166882"/>
-            <a:ext cx="8482198" cy="4524236"/>
+            <a:off x="229305" y="1334136"/>
+            <a:ext cx="8684543" cy="4501852"/>
           </a:xfrm>
           <a:prstGeom prst="rect">
             <a:avLst/>
           </a:prstGeom>
+          <a:noFill/>
+          <a:extLst>
+            <a:ext uri="{909E8E84-426E-40DD-AFC4-6F175D3DCCD1}">
+              <a14:hiddenFill xmlns:a14="http://schemas.microsoft.com/office/drawing/2010/main">
+                <a:solidFill>
+                  <a:srgbClr val="FFFFFF"/>
+                </a:solidFill>
+              </a14:hiddenFill>
+            </a:ext>
+          </a:extLst>
         </p:spPr>
       </p:pic>
     </p:spTree>
@@ -14372,7 +14400,7 @@
           <p:cNvPr id="2" name="바닥글 개체 틀 1">
             <a:extLst>
               <a:ext uri="{FF2B5EF4-FFF2-40B4-BE49-F238E27FC236}">
-                <a16:creationId xmlns:a16="http://schemas.microsoft.com/office/drawing/2014/main" id="{6AF1B24E-7C31-D352-239D-5307CEE5F3BA}"/>
+                <a16:creationId xmlns:a16="http://schemas.microsoft.com/office/drawing/2014/main" xmlns="" id="{6AF1B24E-7C31-D352-239D-5307CEE5F3BA}"/>
               </a:ext>
             </a:extLst>
           </p:cNvPr>
@@ -14402,7 +14430,7 @@
           <p:cNvPr id="3" name="표 3">
             <a:extLst>
               <a:ext uri="{FF2B5EF4-FFF2-40B4-BE49-F238E27FC236}">
-                <a16:creationId xmlns:a16="http://schemas.microsoft.com/office/drawing/2014/main" id="{83E41BCA-5946-F23B-DDB2-A15A43C3D242}"/>
+                <a16:creationId xmlns:a16="http://schemas.microsoft.com/office/drawing/2014/main" xmlns="" id="{83E41BCA-5946-F23B-DDB2-A15A43C3D242}"/>
               </a:ext>
             </a:extLst>
           </p:cNvPr>
@@ -14425,28 +14453,28 @@
                 <a:gridCol w="1143368">
                   <a:extLst>
                     <a:ext uri="{9D8B030D-6E8A-4147-A177-3AD203B41FA5}">
-                      <a16:colId xmlns:a16="http://schemas.microsoft.com/office/drawing/2014/main" val="2009367983"/>
+                      <a16:colId xmlns:a16="http://schemas.microsoft.com/office/drawing/2014/main" xmlns="" val="2009367983"/>
                     </a:ext>
                   </a:extLst>
                 </a:gridCol>
                 <a:gridCol w="3328368">
                   <a:extLst>
                     <a:ext uri="{9D8B030D-6E8A-4147-A177-3AD203B41FA5}">
-                      <a16:colId xmlns:a16="http://schemas.microsoft.com/office/drawing/2014/main" val="3488438301"/>
+                      <a16:colId xmlns:a16="http://schemas.microsoft.com/office/drawing/2014/main" xmlns="" val="3488438301"/>
                     </a:ext>
                   </a:extLst>
                 </a:gridCol>
                 <a:gridCol w="1159043">
                   <a:extLst>
                     <a:ext uri="{9D8B030D-6E8A-4147-A177-3AD203B41FA5}">
-                      <a16:colId xmlns:a16="http://schemas.microsoft.com/office/drawing/2014/main" val="57341383"/>
+                      <a16:colId xmlns:a16="http://schemas.microsoft.com/office/drawing/2014/main" xmlns="" val="57341383"/>
                     </a:ext>
                   </a:extLst>
                 </a:gridCol>
                 <a:gridCol w="3312693">
                   <a:extLst>
                     <a:ext uri="{9D8B030D-6E8A-4147-A177-3AD203B41FA5}">
-                      <a16:colId xmlns:a16="http://schemas.microsoft.com/office/drawing/2014/main" val="3830577718"/>
+                      <a16:colId xmlns:a16="http://schemas.microsoft.com/office/drawing/2014/main" xmlns="" val="3830577718"/>
                     </a:ext>
                   </a:extLst>
                 </a:gridCol>
@@ -14786,7 +14814,7 @@
                 </a:tc>
                 <a:extLst>
                   <a:ext uri="{0D108BD9-81ED-4DB2-BD59-A6C34878D82A}">
-                    <a16:rowId xmlns:a16="http://schemas.microsoft.com/office/drawing/2014/main" val="2378104980"/>
+                    <a16:rowId xmlns:a16="http://schemas.microsoft.com/office/drawing/2014/main" xmlns="" val="2378104980"/>
                   </a:ext>
                 </a:extLst>
               </a:tr>
@@ -14963,7 +14991,7 @@
                 </a:tc>
                 <a:extLst>
                   <a:ext uri="{0D108BD9-81ED-4DB2-BD59-A6C34878D82A}">
-                    <a16:rowId xmlns:a16="http://schemas.microsoft.com/office/drawing/2014/main" val="966726498"/>
+                    <a16:rowId xmlns:a16="http://schemas.microsoft.com/office/drawing/2014/main" xmlns="" val="966726498"/>
                   </a:ext>
                 </a:extLst>
               </a:tr>
@@ -14973,15 +15001,9 @@
       </p:graphicFrame>
       <p:pic>
         <p:nvPicPr>
-          <p:cNvPr id="5" name="그림 4">
-            <a:extLst>
-              <a:ext uri="{FF2B5EF4-FFF2-40B4-BE49-F238E27FC236}">
-                <a16:creationId xmlns:a16="http://schemas.microsoft.com/office/drawing/2014/main" id="{BF5566FC-0B73-272D-1B77-B1AD4286116B}"/>
-              </a:ext>
-            </a:extLst>
-          </p:cNvPr>
+          <p:cNvPr id="5122" name="Picture 2" descr="C:\Users\user1\Desktop\4.png"/>
           <p:cNvPicPr>
-            <a:picLocks noChangeAspect="1"/>
+            <a:picLocks noChangeAspect="1" noChangeArrowheads="1"/>
           </p:cNvPicPr>
           <p:nvPr/>
         </p:nvPicPr>
@@ -14993,18 +15015,29 @@
               </a:ext>
             </a:extLst>
           </a:blip>
+          <a:srcRect/>
           <a:stretch>
             <a:fillRect/>
           </a:stretch>
         </p:blipFill>
-        <p:spPr>
+        <p:spPr bwMode="auto">
           <a:xfrm>
-            <a:off x="394872" y="1569155"/>
-            <a:ext cx="8354256" cy="3933483"/>
+            <a:off x="170184" y="1490347"/>
+            <a:ext cx="8793341" cy="4112895"/>
           </a:xfrm>
           <a:prstGeom prst="rect">
             <a:avLst/>
           </a:prstGeom>
+          <a:noFill/>
+          <a:extLst>
+            <a:ext uri="{909E8E84-426E-40DD-AFC4-6F175D3DCCD1}">
+              <a14:hiddenFill xmlns:a14="http://schemas.microsoft.com/office/drawing/2010/main">
+                <a:solidFill>
+                  <a:srgbClr val="FFFFFF"/>
+                </a:solidFill>
+              </a14:hiddenFill>
+            </a:ext>
+          </a:extLst>
         </p:spPr>
       </p:pic>
     </p:spTree>
@@ -15042,7 +15075,7 @@
           <p:cNvPr id="2" name="바닥글 개체 틀 1">
             <a:extLst>
               <a:ext uri="{FF2B5EF4-FFF2-40B4-BE49-F238E27FC236}">
-                <a16:creationId xmlns:a16="http://schemas.microsoft.com/office/drawing/2014/main" id="{6AF1B24E-7C31-D352-239D-5307CEE5F3BA}"/>
+                <a16:creationId xmlns:a16="http://schemas.microsoft.com/office/drawing/2014/main" xmlns="" id="{6AF1B24E-7C31-D352-239D-5307CEE5F3BA}"/>
               </a:ext>
             </a:extLst>
           </p:cNvPr>
@@ -15072,7 +15105,7 @@
           <p:cNvPr id="3" name="표 3">
             <a:extLst>
               <a:ext uri="{FF2B5EF4-FFF2-40B4-BE49-F238E27FC236}">
-                <a16:creationId xmlns:a16="http://schemas.microsoft.com/office/drawing/2014/main" id="{83E41BCA-5946-F23B-DDB2-A15A43C3D242}"/>
+                <a16:creationId xmlns:a16="http://schemas.microsoft.com/office/drawing/2014/main" xmlns="" id="{83E41BCA-5946-F23B-DDB2-A15A43C3D242}"/>
               </a:ext>
             </a:extLst>
           </p:cNvPr>
@@ -15095,28 +15128,28 @@
                 <a:gridCol w="1143368">
                   <a:extLst>
                     <a:ext uri="{9D8B030D-6E8A-4147-A177-3AD203B41FA5}">
-                      <a16:colId xmlns:a16="http://schemas.microsoft.com/office/drawing/2014/main" val="2009367983"/>
+                      <a16:colId xmlns:a16="http://schemas.microsoft.com/office/drawing/2014/main" xmlns="" val="2009367983"/>
                     </a:ext>
                   </a:extLst>
                 </a:gridCol>
                 <a:gridCol w="3328368">
                   <a:extLst>
                     <a:ext uri="{9D8B030D-6E8A-4147-A177-3AD203B41FA5}">
-                      <a16:colId xmlns:a16="http://schemas.microsoft.com/office/drawing/2014/main" val="3488438301"/>
+                      <a16:colId xmlns:a16="http://schemas.microsoft.com/office/drawing/2014/main" xmlns="" val="3488438301"/>
                     </a:ext>
                   </a:extLst>
                 </a:gridCol>
                 <a:gridCol w="1159043">
                   <a:extLst>
                     <a:ext uri="{9D8B030D-6E8A-4147-A177-3AD203B41FA5}">
-                      <a16:colId xmlns:a16="http://schemas.microsoft.com/office/drawing/2014/main" val="57341383"/>
+                      <a16:colId xmlns:a16="http://schemas.microsoft.com/office/drawing/2014/main" xmlns="" val="57341383"/>
                     </a:ext>
                   </a:extLst>
                 </a:gridCol>
                 <a:gridCol w="3312693">
                   <a:extLst>
                     <a:ext uri="{9D8B030D-6E8A-4147-A177-3AD203B41FA5}">
-                      <a16:colId xmlns:a16="http://schemas.microsoft.com/office/drawing/2014/main" val="3830577718"/>
+                      <a16:colId xmlns:a16="http://schemas.microsoft.com/office/drawing/2014/main" xmlns="" val="3830577718"/>
                     </a:ext>
                   </a:extLst>
                 </a:gridCol>
@@ -15456,7 +15489,7 @@
                 </a:tc>
                 <a:extLst>
                   <a:ext uri="{0D108BD9-81ED-4DB2-BD59-A6C34878D82A}">
-                    <a16:rowId xmlns:a16="http://schemas.microsoft.com/office/drawing/2014/main" val="2378104980"/>
+                    <a16:rowId xmlns:a16="http://schemas.microsoft.com/office/drawing/2014/main" xmlns="" val="2378104980"/>
                   </a:ext>
                 </a:extLst>
               </a:tr>
@@ -15633,7 +15666,7 @@
                 </a:tc>
                 <a:extLst>
                   <a:ext uri="{0D108BD9-81ED-4DB2-BD59-A6C34878D82A}">
-                    <a16:rowId xmlns:a16="http://schemas.microsoft.com/office/drawing/2014/main" val="966726498"/>
+                    <a16:rowId xmlns:a16="http://schemas.microsoft.com/office/drawing/2014/main" xmlns="" val="966726498"/>
                   </a:ext>
                 </a:extLst>
               </a:tr>
@@ -15646,7 +15679,7 @@
           <p:cNvPr id="5" name="그림 4">
             <a:extLst>
               <a:ext uri="{FF2B5EF4-FFF2-40B4-BE49-F238E27FC236}">
-                <a16:creationId xmlns:a16="http://schemas.microsoft.com/office/drawing/2014/main" id="{A0ABE44C-2AB9-C608-EDE1-9BF036716894}"/>
+                <a16:creationId xmlns:a16="http://schemas.microsoft.com/office/drawing/2014/main" xmlns="" id="{A0ABE44C-2AB9-C608-EDE1-9BF036716894}"/>
               </a:ext>
             </a:extLst>
           </p:cNvPr>
@@ -15706,7 +15739,7 @@
           <p:cNvPr id="2" name="바닥글 개체 틀 1">
             <a:extLst>
               <a:ext uri="{FF2B5EF4-FFF2-40B4-BE49-F238E27FC236}">
-                <a16:creationId xmlns:a16="http://schemas.microsoft.com/office/drawing/2014/main" id="{6AF1B24E-7C31-D352-239D-5307CEE5F3BA}"/>
+                <a16:creationId xmlns:a16="http://schemas.microsoft.com/office/drawing/2014/main" xmlns="" id="{6AF1B24E-7C31-D352-239D-5307CEE5F3BA}"/>
               </a:ext>
             </a:extLst>
           </p:cNvPr>
@@ -15736,7 +15769,7 @@
           <p:cNvPr id="3" name="표 3">
             <a:extLst>
               <a:ext uri="{FF2B5EF4-FFF2-40B4-BE49-F238E27FC236}">
-                <a16:creationId xmlns:a16="http://schemas.microsoft.com/office/drawing/2014/main" id="{83E41BCA-5946-F23B-DDB2-A15A43C3D242}"/>
+                <a16:creationId xmlns:a16="http://schemas.microsoft.com/office/drawing/2014/main" xmlns="" id="{83E41BCA-5946-F23B-DDB2-A15A43C3D242}"/>
               </a:ext>
             </a:extLst>
           </p:cNvPr>
@@ -15759,28 +15792,28 @@
                 <a:gridCol w="1143368">
                   <a:extLst>
                     <a:ext uri="{9D8B030D-6E8A-4147-A177-3AD203B41FA5}">
-                      <a16:colId xmlns:a16="http://schemas.microsoft.com/office/drawing/2014/main" val="2009367983"/>
+                      <a16:colId xmlns:a16="http://schemas.microsoft.com/office/drawing/2014/main" xmlns="" val="2009367983"/>
                     </a:ext>
                   </a:extLst>
                 </a:gridCol>
                 <a:gridCol w="3328368">
                   <a:extLst>
                     <a:ext uri="{9D8B030D-6E8A-4147-A177-3AD203B41FA5}">
-                      <a16:colId xmlns:a16="http://schemas.microsoft.com/office/drawing/2014/main" val="3488438301"/>
+                      <a16:colId xmlns:a16="http://schemas.microsoft.com/office/drawing/2014/main" xmlns="" val="3488438301"/>
                     </a:ext>
                   </a:extLst>
                 </a:gridCol>
                 <a:gridCol w="1159043">
                   <a:extLst>
                     <a:ext uri="{9D8B030D-6E8A-4147-A177-3AD203B41FA5}">
-                      <a16:colId xmlns:a16="http://schemas.microsoft.com/office/drawing/2014/main" val="57341383"/>
+                      <a16:colId xmlns:a16="http://schemas.microsoft.com/office/drawing/2014/main" xmlns="" val="57341383"/>
                     </a:ext>
                   </a:extLst>
                 </a:gridCol>
                 <a:gridCol w="3312693">
                   <a:extLst>
                     <a:ext uri="{9D8B030D-6E8A-4147-A177-3AD203B41FA5}">
-                      <a16:colId xmlns:a16="http://schemas.microsoft.com/office/drawing/2014/main" val="3830577718"/>
+                      <a16:colId xmlns:a16="http://schemas.microsoft.com/office/drawing/2014/main" xmlns="" val="3830577718"/>
                     </a:ext>
                   </a:extLst>
                 </a:gridCol>
@@ -16120,7 +16153,7 @@
                 </a:tc>
                 <a:extLst>
                   <a:ext uri="{0D108BD9-81ED-4DB2-BD59-A6C34878D82A}">
-                    <a16:rowId xmlns:a16="http://schemas.microsoft.com/office/drawing/2014/main" val="2378104980"/>
+                    <a16:rowId xmlns:a16="http://schemas.microsoft.com/office/drawing/2014/main" xmlns="" val="2378104980"/>
                   </a:ext>
                 </a:extLst>
               </a:tr>
@@ -16297,7 +16330,7 @@
                 </a:tc>
                 <a:extLst>
                   <a:ext uri="{0D108BD9-81ED-4DB2-BD59-A6C34878D82A}">
-                    <a16:rowId xmlns:a16="http://schemas.microsoft.com/office/drawing/2014/main" val="966726498"/>
+                    <a16:rowId xmlns:a16="http://schemas.microsoft.com/office/drawing/2014/main" xmlns="" val="966726498"/>
                   </a:ext>
                 </a:extLst>
               </a:tr>
@@ -16310,7 +16343,7 @@
           <p:cNvPr id="5" name="그림 4">
             <a:extLst>
               <a:ext uri="{FF2B5EF4-FFF2-40B4-BE49-F238E27FC236}">
-                <a16:creationId xmlns:a16="http://schemas.microsoft.com/office/drawing/2014/main" id="{5FA96EFB-3029-A83E-CC41-C0DE80C32917}"/>
+                <a16:creationId xmlns:a16="http://schemas.microsoft.com/office/drawing/2014/main" xmlns="" id="{5FA96EFB-3029-A83E-CC41-C0DE80C32917}"/>
               </a:ext>
             </a:extLst>
           </p:cNvPr>
@@ -16370,7 +16403,7 @@
           <p:cNvPr id="2" name="바닥글 개체 틀 1">
             <a:extLst>
               <a:ext uri="{FF2B5EF4-FFF2-40B4-BE49-F238E27FC236}">
-                <a16:creationId xmlns:a16="http://schemas.microsoft.com/office/drawing/2014/main" id="{6AF1B24E-7C31-D352-239D-5307CEE5F3BA}"/>
+                <a16:creationId xmlns:a16="http://schemas.microsoft.com/office/drawing/2014/main" xmlns="" id="{6AF1B24E-7C31-D352-239D-5307CEE5F3BA}"/>
               </a:ext>
             </a:extLst>
           </p:cNvPr>
@@ -16400,7 +16433,7 @@
           <p:cNvPr id="3" name="표 3">
             <a:extLst>
               <a:ext uri="{FF2B5EF4-FFF2-40B4-BE49-F238E27FC236}">
-                <a16:creationId xmlns:a16="http://schemas.microsoft.com/office/drawing/2014/main" id="{83E41BCA-5946-F23B-DDB2-A15A43C3D242}"/>
+                <a16:creationId xmlns:a16="http://schemas.microsoft.com/office/drawing/2014/main" xmlns="" id="{83E41BCA-5946-F23B-DDB2-A15A43C3D242}"/>
               </a:ext>
             </a:extLst>
           </p:cNvPr>
@@ -16423,28 +16456,28 @@
                 <a:gridCol w="1143368">
                   <a:extLst>
                     <a:ext uri="{9D8B030D-6E8A-4147-A177-3AD203B41FA5}">
-                      <a16:colId xmlns:a16="http://schemas.microsoft.com/office/drawing/2014/main" val="2009367983"/>
+                      <a16:colId xmlns:a16="http://schemas.microsoft.com/office/drawing/2014/main" xmlns="" val="2009367983"/>
                     </a:ext>
                   </a:extLst>
                 </a:gridCol>
                 <a:gridCol w="3328368">
                   <a:extLst>
                     <a:ext uri="{9D8B030D-6E8A-4147-A177-3AD203B41FA5}">
-                      <a16:colId xmlns:a16="http://schemas.microsoft.com/office/drawing/2014/main" val="3488438301"/>
+                      <a16:colId xmlns:a16="http://schemas.microsoft.com/office/drawing/2014/main" xmlns="" val="3488438301"/>
                     </a:ext>
                   </a:extLst>
                 </a:gridCol>
                 <a:gridCol w="1159043">
                   <a:extLst>
                     <a:ext uri="{9D8B030D-6E8A-4147-A177-3AD203B41FA5}">
-                      <a16:colId xmlns:a16="http://schemas.microsoft.com/office/drawing/2014/main" val="57341383"/>
+                      <a16:colId xmlns:a16="http://schemas.microsoft.com/office/drawing/2014/main" xmlns="" val="57341383"/>
                     </a:ext>
                   </a:extLst>
                 </a:gridCol>
                 <a:gridCol w="3312693">
                   <a:extLst>
                     <a:ext uri="{9D8B030D-6E8A-4147-A177-3AD203B41FA5}">
-                      <a16:colId xmlns:a16="http://schemas.microsoft.com/office/drawing/2014/main" val="3830577718"/>
+                      <a16:colId xmlns:a16="http://schemas.microsoft.com/office/drawing/2014/main" xmlns="" val="3830577718"/>
                     </a:ext>
                   </a:extLst>
                 </a:gridCol>
@@ -16784,7 +16817,7 @@
                 </a:tc>
                 <a:extLst>
                   <a:ext uri="{0D108BD9-81ED-4DB2-BD59-A6C34878D82A}">
-                    <a16:rowId xmlns:a16="http://schemas.microsoft.com/office/drawing/2014/main" val="2378104980"/>
+                    <a16:rowId xmlns:a16="http://schemas.microsoft.com/office/drawing/2014/main" xmlns="" val="2378104980"/>
                   </a:ext>
                 </a:extLst>
               </a:tr>
@@ -16961,7 +16994,7 @@
                 </a:tc>
                 <a:extLst>
                   <a:ext uri="{0D108BD9-81ED-4DB2-BD59-A6C34878D82A}">
-                    <a16:rowId xmlns:a16="http://schemas.microsoft.com/office/drawing/2014/main" val="966726498"/>
+                    <a16:rowId xmlns:a16="http://schemas.microsoft.com/office/drawing/2014/main" xmlns="" val="966726498"/>
                   </a:ext>
                 </a:extLst>
               </a:tr>
@@ -16974,7 +17007,7 @@
           <p:cNvPr id="5" name="그림 4">
             <a:extLst>
               <a:ext uri="{FF2B5EF4-FFF2-40B4-BE49-F238E27FC236}">
-                <a16:creationId xmlns:a16="http://schemas.microsoft.com/office/drawing/2014/main" id="{5E2613FF-3F14-408F-626B-FC8BA42DB16F}"/>
+                <a16:creationId xmlns:a16="http://schemas.microsoft.com/office/drawing/2014/main" xmlns="" id="{5E2613FF-3F14-408F-626B-FC8BA42DB16F}"/>
               </a:ext>
             </a:extLst>
           </p:cNvPr>
@@ -17034,7 +17067,7 @@
           <p:cNvPr id="2" name="바닥글 개체 틀 1">
             <a:extLst>
               <a:ext uri="{FF2B5EF4-FFF2-40B4-BE49-F238E27FC236}">
-                <a16:creationId xmlns:a16="http://schemas.microsoft.com/office/drawing/2014/main" id="{6AF1B24E-7C31-D352-239D-5307CEE5F3BA}"/>
+                <a16:creationId xmlns:a16="http://schemas.microsoft.com/office/drawing/2014/main" xmlns="" id="{6AF1B24E-7C31-D352-239D-5307CEE5F3BA}"/>
               </a:ext>
             </a:extLst>
           </p:cNvPr>
@@ -17064,7 +17097,7 @@
           <p:cNvPr id="3" name="표 3">
             <a:extLst>
               <a:ext uri="{FF2B5EF4-FFF2-40B4-BE49-F238E27FC236}">
-                <a16:creationId xmlns:a16="http://schemas.microsoft.com/office/drawing/2014/main" id="{83E41BCA-5946-F23B-DDB2-A15A43C3D242}"/>
+                <a16:creationId xmlns:a16="http://schemas.microsoft.com/office/drawing/2014/main" xmlns="" id="{83E41BCA-5946-F23B-DDB2-A15A43C3D242}"/>
               </a:ext>
             </a:extLst>
           </p:cNvPr>
@@ -17087,28 +17120,28 @@
                 <a:gridCol w="1143368">
                   <a:extLst>
                     <a:ext uri="{9D8B030D-6E8A-4147-A177-3AD203B41FA5}">
-                      <a16:colId xmlns:a16="http://schemas.microsoft.com/office/drawing/2014/main" val="2009367983"/>
+                      <a16:colId xmlns:a16="http://schemas.microsoft.com/office/drawing/2014/main" xmlns="" val="2009367983"/>
                     </a:ext>
                   </a:extLst>
                 </a:gridCol>
                 <a:gridCol w="3328368">
                   <a:extLst>
                     <a:ext uri="{9D8B030D-6E8A-4147-A177-3AD203B41FA5}">
-                      <a16:colId xmlns:a16="http://schemas.microsoft.com/office/drawing/2014/main" val="3488438301"/>
+                      <a16:colId xmlns:a16="http://schemas.microsoft.com/office/drawing/2014/main" xmlns="" val="3488438301"/>
                     </a:ext>
                   </a:extLst>
                 </a:gridCol>
                 <a:gridCol w="1159043">
                   <a:extLst>
                     <a:ext uri="{9D8B030D-6E8A-4147-A177-3AD203B41FA5}">
-                      <a16:colId xmlns:a16="http://schemas.microsoft.com/office/drawing/2014/main" val="57341383"/>
+                      <a16:colId xmlns:a16="http://schemas.microsoft.com/office/drawing/2014/main" xmlns="" val="57341383"/>
                     </a:ext>
                   </a:extLst>
                 </a:gridCol>
                 <a:gridCol w="3312693">
                   <a:extLst>
                     <a:ext uri="{9D8B030D-6E8A-4147-A177-3AD203B41FA5}">
-                      <a16:colId xmlns:a16="http://schemas.microsoft.com/office/drawing/2014/main" val="3830577718"/>
+                      <a16:colId xmlns:a16="http://schemas.microsoft.com/office/drawing/2014/main" xmlns="" val="3830577718"/>
                     </a:ext>
                   </a:extLst>
                 </a:gridCol>
@@ -17448,7 +17481,7 @@
                 </a:tc>
                 <a:extLst>
                   <a:ext uri="{0D108BD9-81ED-4DB2-BD59-A6C34878D82A}">
-                    <a16:rowId xmlns:a16="http://schemas.microsoft.com/office/drawing/2014/main" val="2378104980"/>
+                    <a16:rowId xmlns:a16="http://schemas.microsoft.com/office/drawing/2014/main" xmlns="" val="2378104980"/>
                   </a:ext>
                 </a:extLst>
               </a:tr>
@@ -17625,7 +17658,7 @@
                 </a:tc>
                 <a:extLst>
                   <a:ext uri="{0D108BD9-81ED-4DB2-BD59-A6C34878D82A}">
-                    <a16:rowId xmlns:a16="http://schemas.microsoft.com/office/drawing/2014/main" val="966726498"/>
+                    <a16:rowId xmlns:a16="http://schemas.microsoft.com/office/drawing/2014/main" xmlns="" val="966726498"/>
                   </a:ext>
                 </a:extLst>
               </a:tr>
@@ -17638,7 +17671,7 @@
           <p:cNvPr id="5" name="그림 4">
             <a:extLst>
               <a:ext uri="{FF2B5EF4-FFF2-40B4-BE49-F238E27FC236}">
-                <a16:creationId xmlns:a16="http://schemas.microsoft.com/office/drawing/2014/main" id="{0B5846D7-3AAA-79E8-055B-A1EDDFF58D4B}"/>
+                <a16:creationId xmlns:a16="http://schemas.microsoft.com/office/drawing/2014/main" xmlns="" id="{0B5846D7-3AAA-79E8-055B-A1EDDFF58D4B}"/>
               </a:ext>
             </a:extLst>
           </p:cNvPr>
@@ -17698,7 +17731,7 @@
           <p:cNvPr id="2" name="바닥글 개체 틀 1">
             <a:extLst>
               <a:ext uri="{FF2B5EF4-FFF2-40B4-BE49-F238E27FC236}">
-                <a16:creationId xmlns:a16="http://schemas.microsoft.com/office/drawing/2014/main" id="{6AF1B24E-7C31-D352-239D-5307CEE5F3BA}"/>
+                <a16:creationId xmlns:a16="http://schemas.microsoft.com/office/drawing/2014/main" xmlns="" id="{6AF1B24E-7C31-D352-239D-5307CEE5F3BA}"/>
               </a:ext>
             </a:extLst>
           </p:cNvPr>
@@ -17728,7 +17761,7 @@
           <p:cNvPr id="3" name="표 3">
             <a:extLst>
               <a:ext uri="{FF2B5EF4-FFF2-40B4-BE49-F238E27FC236}">
-                <a16:creationId xmlns:a16="http://schemas.microsoft.com/office/drawing/2014/main" id="{83E41BCA-5946-F23B-DDB2-A15A43C3D242}"/>
+                <a16:creationId xmlns:a16="http://schemas.microsoft.com/office/drawing/2014/main" xmlns="" id="{83E41BCA-5946-F23B-DDB2-A15A43C3D242}"/>
               </a:ext>
             </a:extLst>
           </p:cNvPr>
@@ -17757,28 +17790,28 @@
                 <a:gridCol w="1143368">
                   <a:extLst>
                     <a:ext uri="{9D8B030D-6E8A-4147-A177-3AD203B41FA5}">
-                      <a16:colId xmlns:a16="http://schemas.microsoft.com/office/drawing/2014/main" val="2009367983"/>
+                      <a16:colId xmlns:a16="http://schemas.microsoft.com/office/drawing/2014/main" xmlns="" val="2009367983"/>
                     </a:ext>
                   </a:extLst>
                 </a:gridCol>
                 <a:gridCol w="3328368">
                   <a:extLst>
                     <a:ext uri="{9D8B030D-6E8A-4147-A177-3AD203B41FA5}">
-                      <a16:colId xmlns:a16="http://schemas.microsoft.com/office/drawing/2014/main" val="3488438301"/>
+                      <a16:colId xmlns:a16="http://schemas.microsoft.com/office/drawing/2014/main" xmlns="" val="3488438301"/>
                     </a:ext>
                   </a:extLst>
                 </a:gridCol>
                 <a:gridCol w="1159043">
                   <a:extLst>
                     <a:ext uri="{9D8B030D-6E8A-4147-A177-3AD203B41FA5}">
-                      <a16:colId xmlns:a16="http://schemas.microsoft.com/office/drawing/2014/main" val="57341383"/>
+                      <a16:colId xmlns:a16="http://schemas.microsoft.com/office/drawing/2014/main" xmlns="" val="57341383"/>
                     </a:ext>
                   </a:extLst>
                 </a:gridCol>
                 <a:gridCol w="3312693">
                   <a:extLst>
                     <a:ext uri="{9D8B030D-6E8A-4147-A177-3AD203B41FA5}">
-                      <a16:colId xmlns:a16="http://schemas.microsoft.com/office/drawing/2014/main" val="3830577718"/>
+                      <a16:colId xmlns:a16="http://schemas.microsoft.com/office/drawing/2014/main" xmlns="" val="3830577718"/>
                     </a:ext>
                   </a:extLst>
                 </a:gridCol>
@@ -18118,7 +18151,7 @@
                 </a:tc>
                 <a:extLst>
                   <a:ext uri="{0D108BD9-81ED-4DB2-BD59-A6C34878D82A}">
-                    <a16:rowId xmlns:a16="http://schemas.microsoft.com/office/drawing/2014/main" val="2378104980"/>
+                    <a16:rowId xmlns:a16="http://schemas.microsoft.com/office/drawing/2014/main" xmlns="" val="2378104980"/>
                   </a:ext>
                 </a:extLst>
               </a:tr>
@@ -18295,7 +18328,7 @@
                 </a:tc>
                 <a:extLst>
                   <a:ext uri="{0D108BD9-81ED-4DB2-BD59-A6C34878D82A}">
-                    <a16:rowId xmlns:a16="http://schemas.microsoft.com/office/drawing/2014/main" val="966726498"/>
+                    <a16:rowId xmlns:a16="http://schemas.microsoft.com/office/drawing/2014/main" xmlns="" val="966726498"/>
                   </a:ext>
                 </a:extLst>
               </a:tr>
@@ -18308,7 +18341,7 @@
           <p:cNvPr id="5" name="그림 4">
             <a:extLst>
               <a:ext uri="{FF2B5EF4-FFF2-40B4-BE49-F238E27FC236}">
-                <a16:creationId xmlns:a16="http://schemas.microsoft.com/office/drawing/2014/main" id="{5E97E0DE-6AC1-80EC-8EDD-94D5ABE6DB03}"/>
+                <a16:creationId xmlns:a16="http://schemas.microsoft.com/office/drawing/2014/main" xmlns="" id="{5E97E0DE-6AC1-80EC-8EDD-94D5ABE6DB03}"/>
               </a:ext>
             </a:extLst>
           </p:cNvPr>
@@ -18344,7 +18377,7 @@
           <p:cNvPr id="6" name="TextBox 5">
             <a:extLst>
               <a:ext uri="{FF2B5EF4-FFF2-40B4-BE49-F238E27FC236}">
-                <a16:creationId xmlns:a16="http://schemas.microsoft.com/office/drawing/2014/main" id="{EB4459E4-1C19-1C7E-8E49-A95EFFAF4478}"/>
+                <a16:creationId xmlns:a16="http://schemas.microsoft.com/office/drawing/2014/main" xmlns="" id="{EB4459E4-1C19-1C7E-8E49-A95EFFAF4478}"/>
               </a:ext>
             </a:extLst>
           </p:cNvPr>
@@ -18409,7 +18442,7 @@
           <p:cNvPr id="2" name="바닥글 개체 틀 1">
             <a:extLst>
               <a:ext uri="{FF2B5EF4-FFF2-40B4-BE49-F238E27FC236}">
-                <a16:creationId xmlns:a16="http://schemas.microsoft.com/office/drawing/2014/main" id="{6AF1B24E-7C31-D352-239D-5307CEE5F3BA}"/>
+                <a16:creationId xmlns:a16="http://schemas.microsoft.com/office/drawing/2014/main" xmlns="" id="{6AF1B24E-7C31-D352-239D-5307CEE5F3BA}"/>
               </a:ext>
             </a:extLst>
           </p:cNvPr>
@@ -18439,7 +18472,7 @@
           <p:cNvPr id="3" name="표 3">
             <a:extLst>
               <a:ext uri="{FF2B5EF4-FFF2-40B4-BE49-F238E27FC236}">
-                <a16:creationId xmlns:a16="http://schemas.microsoft.com/office/drawing/2014/main" id="{83E41BCA-5946-F23B-DDB2-A15A43C3D242}"/>
+                <a16:creationId xmlns:a16="http://schemas.microsoft.com/office/drawing/2014/main" xmlns="" id="{83E41BCA-5946-F23B-DDB2-A15A43C3D242}"/>
               </a:ext>
             </a:extLst>
           </p:cNvPr>
@@ -18462,28 +18495,28 @@
                 <a:gridCol w="1143368">
                   <a:extLst>
                     <a:ext uri="{9D8B030D-6E8A-4147-A177-3AD203B41FA5}">
-                      <a16:colId xmlns:a16="http://schemas.microsoft.com/office/drawing/2014/main" val="2009367983"/>
+                      <a16:colId xmlns:a16="http://schemas.microsoft.com/office/drawing/2014/main" xmlns="" val="2009367983"/>
                     </a:ext>
                   </a:extLst>
                 </a:gridCol>
                 <a:gridCol w="3328368">
                   <a:extLst>
                     <a:ext uri="{9D8B030D-6E8A-4147-A177-3AD203B41FA5}">
-                      <a16:colId xmlns:a16="http://schemas.microsoft.com/office/drawing/2014/main" val="3488438301"/>
+                      <a16:colId xmlns:a16="http://schemas.microsoft.com/office/drawing/2014/main" xmlns="" val="3488438301"/>
                     </a:ext>
                   </a:extLst>
                 </a:gridCol>
                 <a:gridCol w="1159043">
                   <a:extLst>
                     <a:ext uri="{9D8B030D-6E8A-4147-A177-3AD203B41FA5}">
-                      <a16:colId xmlns:a16="http://schemas.microsoft.com/office/drawing/2014/main" val="57341383"/>
+                      <a16:colId xmlns:a16="http://schemas.microsoft.com/office/drawing/2014/main" xmlns="" val="57341383"/>
                     </a:ext>
                   </a:extLst>
                 </a:gridCol>
                 <a:gridCol w="3312693">
                   <a:extLst>
                     <a:ext uri="{9D8B030D-6E8A-4147-A177-3AD203B41FA5}">
-                      <a16:colId xmlns:a16="http://schemas.microsoft.com/office/drawing/2014/main" val="3830577718"/>
+                      <a16:colId xmlns:a16="http://schemas.microsoft.com/office/drawing/2014/main" xmlns="" val="3830577718"/>
                     </a:ext>
                   </a:extLst>
                 </a:gridCol>
@@ -18823,7 +18856,7 @@
                 </a:tc>
                 <a:extLst>
                   <a:ext uri="{0D108BD9-81ED-4DB2-BD59-A6C34878D82A}">
-                    <a16:rowId xmlns:a16="http://schemas.microsoft.com/office/drawing/2014/main" val="2378104980"/>
+                    <a16:rowId xmlns:a16="http://schemas.microsoft.com/office/drawing/2014/main" xmlns="" val="2378104980"/>
                   </a:ext>
                 </a:extLst>
               </a:tr>
@@ -19000,7 +19033,7 @@
                 </a:tc>
                 <a:extLst>
                   <a:ext uri="{0D108BD9-81ED-4DB2-BD59-A6C34878D82A}">
-                    <a16:rowId xmlns:a16="http://schemas.microsoft.com/office/drawing/2014/main" val="966726498"/>
+                    <a16:rowId xmlns:a16="http://schemas.microsoft.com/office/drawing/2014/main" xmlns="" val="966726498"/>
                   </a:ext>
                 </a:extLst>
               </a:tr>
@@ -19013,7 +19046,7 @@
           <p:cNvPr id="5" name="그림 4">
             <a:extLst>
               <a:ext uri="{FF2B5EF4-FFF2-40B4-BE49-F238E27FC236}">
-                <a16:creationId xmlns:a16="http://schemas.microsoft.com/office/drawing/2014/main" id="{53E6F48E-113F-31CC-6E30-A014D598BB01}"/>
+                <a16:creationId xmlns:a16="http://schemas.microsoft.com/office/drawing/2014/main" xmlns="" id="{53E6F48E-113F-31CC-6E30-A014D598BB01}"/>
               </a:ext>
             </a:extLst>
           </p:cNvPr>
@@ -19073,7 +19106,7 @@
           <p:cNvPr id="2" name="바닥글 개체 틀 1">
             <a:extLst>
               <a:ext uri="{FF2B5EF4-FFF2-40B4-BE49-F238E27FC236}">
-                <a16:creationId xmlns:a16="http://schemas.microsoft.com/office/drawing/2014/main" id="{6AF1B24E-7C31-D352-239D-5307CEE5F3BA}"/>
+                <a16:creationId xmlns:a16="http://schemas.microsoft.com/office/drawing/2014/main" xmlns="" id="{6AF1B24E-7C31-D352-239D-5307CEE5F3BA}"/>
               </a:ext>
             </a:extLst>
           </p:cNvPr>
@@ -19103,7 +19136,7 @@
           <p:cNvPr id="3" name="표 3">
             <a:extLst>
               <a:ext uri="{FF2B5EF4-FFF2-40B4-BE49-F238E27FC236}">
-                <a16:creationId xmlns:a16="http://schemas.microsoft.com/office/drawing/2014/main" id="{83E41BCA-5946-F23B-DDB2-A15A43C3D242}"/>
+                <a16:creationId xmlns:a16="http://schemas.microsoft.com/office/drawing/2014/main" xmlns="" id="{83E41BCA-5946-F23B-DDB2-A15A43C3D242}"/>
               </a:ext>
             </a:extLst>
           </p:cNvPr>
@@ -19126,28 +19159,28 @@
                 <a:gridCol w="1143368">
                   <a:extLst>
                     <a:ext uri="{9D8B030D-6E8A-4147-A177-3AD203B41FA5}">
-                      <a16:colId xmlns:a16="http://schemas.microsoft.com/office/drawing/2014/main" val="2009367983"/>
+                      <a16:colId xmlns:a16="http://schemas.microsoft.com/office/drawing/2014/main" xmlns="" val="2009367983"/>
                     </a:ext>
                   </a:extLst>
                 </a:gridCol>
                 <a:gridCol w="3328368">
                   <a:extLst>
                     <a:ext uri="{9D8B030D-6E8A-4147-A177-3AD203B41FA5}">
-                      <a16:colId xmlns:a16="http://schemas.microsoft.com/office/drawing/2014/main" val="3488438301"/>
+                      <a16:colId xmlns:a16="http://schemas.microsoft.com/office/drawing/2014/main" xmlns="" val="3488438301"/>
                     </a:ext>
                   </a:extLst>
                 </a:gridCol>
                 <a:gridCol w="1159043">
                   <a:extLst>
                     <a:ext uri="{9D8B030D-6E8A-4147-A177-3AD203B41FA5}">
-                      <a16:colId xmlns:a16="http://schemas.microsoft.com/office/drawing/2014/main" val="57341383"/>
+                      <a16:colId xmlns:a16="http://schemas.microsoft.com/office/drawing/2014/main" xmlns="" val="57341383"/>
                     </a:ext>
                   </a:extLst>
                 </a:gridCol>
                 <a:gridCol w="3312693">
                   <a:extLst>
                     <a:ext uri="{9D8B030D-6E8A-4147-A177-3AD203B41FA5}">
-                      <a16:colId xmlns:a16="http://schemas.microsoft.com/office/drawing/2014/main" val="3830577718"/>
+                      <a16:colId xmlns:a16="http://schemas.microsoft.com/office/drawing/2014/main" xmlns="" val="3830577718"/>
                     </a:ext>
                   </a:extLst>
                 </a:gridCol>
@@ -19487,7 +19520,7 @@
                 </a:tc>
                 <a:extLst>
                   <a:ext uri="{0D108BD9-81ED-4DB2-BD59-A6C34878D82A}">
-                    <a16:rowId xmlns:a16="http://schemas.microsoft.com/office/drawing/2014/main" val="2378104980"/>
+                    <a16:rowId xmlns:a16="http://schemas.microsoft.com/office/drawing/2014/main" xmlns="" val="2378104980"/>
                   </a:ext>
                 </a:extLst>
               </a:tr>
@@ -19664,7 +19697,7 @@
                 </a:tc>
                 <a:extLst>
                   <a:ext uri="{0D108BD9-81ED-4DB2-BD59-A6C34878D82A}">
-                    <a16:rowId xmlns:a16="http://schemas.microsoft.com/office/drawing/2014/main" val="966726498"/>
+                    <a16:rowId xmlns:a16="http://schemas.microsoft.com/office/drawing/2014/main" xmlns="" val="966726498"/>
                   </a:ext>
                 </a:extLst>
               </a:tr>
@@ -19677,7 +19710,7 @@
           <p:cNvPr id="5" name="그림 4">
             <a:extLst>
               <a:ext uri="{FF2B5EF4-FFF2-40B4-BE49-F238E27FC236}">
-                <a16:creationId xmlns:a16="http://schemas.microsoft.com/office/drawing/2014/main" id="{864655E0-4ED6-990A-CBBB-CFB34440AE48}"/>
+                <a16:creationId xmlns:a16="http://schemas.microsoft.com/office/drawing/2014/main" xmlns="" id="{864655E0-4ED6-990A-CBBB-CFB34440AE48}"/>
               </a:ext>
             </a:extLst>
           </p:cNvPr>
@@ -19737,7 +19770,7 @@
           <p:cNvPr id="2" name="바닥글 개체 틀 1">
             <a:extLst>
               <a:ext uri="{FF2B5EF4-FFF2-40B4-BE49-F238E27FC236}">
-                <a16:creationId xmlns:a16="http://schemas.microsoft.com/office/drawing/2014/main" id="{6AF1B24E-7C31-D352-239D-5307CEE5F3BA}"/>
+                <a16:creationId xmlns:a16="http://schemas.microsoft.com/office/drawing/2014/main" xmlns="" id="{6AF1B24E-7C31-D352-239D-5307CEE5F3BA}"/>
               </a:ext>
             </a:extLst>
           </p:cNvPr>
@@ -19767,7 +19800,7 @@
           <p:cNvPr id="3" name="표 3">
             <a:extLst>
               <a:ext uri="{FF2B5EF4-FFF2-40B4-BE49-F238E27FC236}">
-                <a16:creationId xmlns:a16="http://schemas.microsoft.com/office/drawing/2014/main" id="{83E41BCA-5946-F23B-DDB2-A15A43C3D242}"/>
+                <a16:creationId xmlns:a16="http://schemas.microsoft.com/office/drawing/2014/main" xmlns="" id="{83E41BCA-5946-F23B-DDB2-A15A43C3D242}"/>
               </a:ext>
             </a:extLst>
           </p:cNvPr>
@@ -19790,28 +19823,28 @@
                 <a:gridCol w="1143368">
                   <a:extLst>
                     <a:ext uri="{9D8B030D-6E8A-4147-A177-3AD203B41FA5}">
-                      <a16:colId xmlns:a16="http://schemas.microsoft.com/office/drawing/2014/main" val="2009367983"/>
+                      <a16:colId xmlns:a16="http://schemas.microsoft.com/office/drawing/2014/main" xmlns="" val="2009367983"/>
                     </a:ext>
                   </a:extLst>
                 </a:gridCol>
                 <a:gridCol w="3328368">
                   <a:extLst>
                     <a:ext uri="{9D8B030D-6E8A-4147-A177-3AD203B41FA5}">
-                      <a16:colId xmlns:a16="http://schemas.microsoft.com/office/drawing/2014/main" val="3488438301"/>
+                      <a16:colId xmlns:a16="http://schemas.microsoft.com/office/drawing/2014/main" xmlns="" val="3488438301"/>
                     </a:ext>
                   </a:extLst>
                 </a:gridCol>
                 <a:gridCol w="1159043">
                   <a:extLst>
                     <a:ext uri="{9D8B030D-6E8A-4147-A177-3AD203B41FA5}">
-                      <a16:colId xmlns:a16="http://schemas.microsoft.com/office/drawing/2014/main" val="57341383"/>
+                      <a16:colId xmlns:a16="http://schemas.microsoft.com/office/drawing/2014/main" xmlns="" val="57341383"/>
                     </a:ext>
                   </a:extLst>
                 </a:gridCol>
                 <a:gridCol w="3312693">
                   <a:extLst>
                     <a:ext uri="{9D8B030D-6E8A-4147-A177-3AD203B41FA5}">
-                      <a16:colId xmlns:a16="http://schemas.microsoft.com/office/drawing/2014/main" val="3830577718"/>
+                      <a16:colId xmlns:a16="http://schemas.microsoft.com/office/drawing/2014/main" xmlns="" val="3830577718"/>
                     </a:ext>
                   </a:extLst>
                 </a:gridCol>
@@ -20151,7 +20184,7 @@
                 </a:tc>
                 <a:extLst>
                   <a:ext uri="{0D108BD9-81ED-4DB2-BD59-A6C34878D82A}">
-                    <a16:rowId xmlns:a16="http://schemas.microsoft.com/office/drawing/2014/main" val="2378104980"/>
+                    <a16:rowId xmlns:a16="http://schemas.microsoft.com/office/drawing/2014/main" xmlns="" val="2378104980"/>
                   </a:ext>
                 </a:extLst>
               </a:tr>
@@ -20328,7 +20361,7 @@
                 </a:tc>
                 <a:extLst>
                   <a:ext uri="{0D108BD9-81ED-4DB2-BD59-A6C34878D82A}">
-                    <a16:rowId xmlns:a16="http://schemas.microsoft.com/office/drawing/2014/main" val="966726498"/>
+                    <a16:rowId xmlns:a16="http://schemas.microsoft.com/office/drawing/2014/main" xmlns="" val="966726498"/>
                   </a:ext>
                 </a:extLst>
               </a:tr>
@@ -20341,7 +20374,7 @@
           <p:cNvPr id="5" name="그림 4">
             <a:extLst>
               <a:ext uri="{FF2B5EF4-FFF2-40B4-BE49-F238E27FC236}">
-                <a16:creationId xmlns:a16="http://schemas.microsoft.com/office/drawing/2014/main" id="{CAEB9245-09CA-62B0-0251-E89B7804220B}"/>
+                <a16:creationId xmlns:a16="http://schemas.microsoft.com/office/drawing/2014/main" xmlns="" id="{CAEB9245-09CA-62B0-0251-E89B7804220B}"/>
               </a:ext>
             </a:extLst>
           </p:cNvPr>
@@ -20401,7 +20434,7 @@
           <p:cNvPr id="2" name="바닥글 개체 틀 1">
             <a:extLst>
               <a:ext uri="{FF2B5EF4-FFF2-40B4-BE49-F238E27FC236}">
-                <a16:creationId xmlns:a16="http://schemas.microsoft.com/office/drawing/2014/main" id="{6AF1B24E-7C31-D352-239D-5307CEE5F3BA}"/>
+                <a16:creationId xmlns:a16="http://schemas.microsoft.com/office/drawing/2014/main" xmlns="" id="{6AF1B24E-7C31-D352-239D-5307CEE5F3BA}"/>
               </a:ext>
             </a:extLst>
           </p:cNvPr>
@@ -20431,7 +20464,7 @@
           <p:cNvPr id="3" name="표 3">
             <a:extLst>
               <a:ext uri="{FF2B5EF4-FFF2-40B4-BE49-F238E27FC236}">
-                <a16:creationId xmlns:a16="http://schemas.microsoft.com/office/drawing/2014/main" id="{83E41BCA-5946-F23B-DDB2-A15A43C3D242}"/>
+                <a16:creationId xmlns:a16="http://schemas.microsoft.com/office/drawing/2014/main" xmlns="" id="{83E41BCA-5946-F23B-DDB2-A15A43C3D242}"/>
               </a:ext>
             </a:extLst>
           </p:cNvPr>
@@ -20454,28 +20487,28 @@
                 <a:gridCol w="1143368">
                   <a:extLst>
                     <a:ext uri="{9D8B030D-6E8A-4147-A177-3AD203B41FA5}">
-                      <a16:colId xmlns:a16="http://schemas.microsoft.com/office/drawing/2014/main" val="2009367983"/>
+                      <a16:colId xmlns:a16="http://schemas.microsoft.com/office/drawing/2014/main" xmlns="" val="2009367983"/>
                     </a:ext>
                   </a:extLst>
                 </a:gridCol>
                 <a:gridCol w="3328368">
                   <a:extLst>
                     <a:ext uri="{9D8B030D-6E8A-4147-A177-3AD203B41FA5}">
-                      <a16:colId xmlns:a16="http://schemas.microsoft.com/office/drawing/2014/main" val="3488438301"/>
+                      <a16:colId xmlns:a16="http://schemas.microsoft.com/office/drawing/2014/main" xmlns="" val="3488438301"/>
                     </a:ext>
                   </a:extLst>
                 </a:gridCol>
                 <a:gridCol w="1159043">
                   <a:extLst>
                     <a:ext uri="{9D8B030D-6E8A-4147-A177-3AD203B41FA5}">
-                      <a16:colId xmlns:a16="http://schemas.microsoft.com/office/drawing/2014/main" val="57341383"/>
+                      <a16:colId xmlns:a16="http://schemas.microsoft.com/office/drawing/2014/main" xmlns="" val="57341383"/>
                     </a:ext>
                   </a:extLst>
                 </a:gridCol>
                 <a:gridCol w="3312693">
                   <a:extLst>
                     <a:ext uri="{9D8B030D-6E8A-4147-A177-3AD203B41FA5}">
-                      <a16:colId xmlns:a16="http://schemas.microsoft.com/office/drawing/2014/main" val="3830577718"/>
+                      <a16:colId xmlns:a16="http://schemas.microsoft.com/office/drawing/2014/main" xmlns="" val="3830577718"/>
                     </a:ext>
                   </a:extLst>
                 </a:gridCol>
@@ -20815,7 +20848,7 @@
                 </a:tc>
                 <a:extLst>
                   <a:ext uri="{0D108BD9-81ED-4DB2-BD59-A6C34878D82A}">
-                    <a16:rowId xmlns:a16="http://schemas.microsoft.com/office/drawing/2014/main" val="2378104980"/>
+                    <a16:rowId xmlns:a16="http://schemas.microsoft.com/office/drawing/2014/main" xmlns="" val="2378104980"/>
                   </a:ext>
                 </a:extLst>
               </a:tr>
@@ -20992,7 +21025,7 @@
                 </a:tc>
                 <a:extLst>
                   <a:ext uri="{0D108BD9-81ED-4DB2-BD59-A6C34878D82A}">
-                    <a16:rowId xmlns:a16="http://schemas.microsoft.com/office/drawing/2014/main" val="966726498"/>
+                    <a16:rowId xmlns:a16="http://schemas.microsoft.com/office/drawing/2014/main" xmlns="" val="966726498"/>
                   </a:ext>
                 </a:extLst>
               </a:tr>
@@ -21005,7 +21038,7 @@
           <p:cNvPr id="5" name="그림 4">
             <a:extLst>
               <a:ext uri="{FF2B5EF4-FFF2-40B4-BE49-F238E27FC236}">
-                <a16:creationId xmlns:a16="http://schemas.microsoft.com/office/drawing/2014/main" id="{05F98527-E533-9A28-39AF-8440B7C79FF2}"/>
+                <a16:creationId xmlns:a16="http://schemas.microsoft.com/office/drawing/2014/main" xmlns="" id="{05F98527-E533-9A28-39AF-8440B7C79FF2}"/>
               </a:ext>
             </a:extLst>
           </p:cNvPr>
@@ -21065,7 +21098,7 @@
           <p:cNvPr id="2" name="바닥글 개체 틀 1">
             <a:extLst>
               <a:ext uri="{FF2B5EF4-FFF2-40B4-BE49-F238E27FC236}">
-                <a16:creationId xmlns:a16="http://schemas.microsoft.com/office/drawing/2014/main" id="{6AF1B24E-7C31-D352-239D-5307CEE5F3BA}"/>
+                <a16:creationId xmlns:a16="http://schemas.microsoft.com/office/drawing/2014/main" xmlns="" id="{6AF1B24E-7C31-D352-239D-5307CEE5F3BA}"/>
               </a:ext>
             </a:extLst>
           </p:cNvPr>
@@ -21095,7 +21128,7 @@
           <p:cNvPr id="3" name="표 3">
             <a:extLst>
               <a:ext uri="{FF2B5EF4-FFF2-40B4-BE49-F238E27FC236}">
-                <a16:creationId xmlns:a16="http://schemas.microsoft.com/office/drawing/2014/main" id="{83E41BCA-5946-F23B-DDB2-A15A43C3D242}"/>
+                <a16:creationId xmlns:a16="http://schemas.microsoft.com/office/drawing/2014/main" xmlns="" id="{83E41BCA-5946-F23B-DDB2-A15A43C3D242}"/>
               </a:ext>
             </a:extLst>
           </p:cNvPr>
@@ -21118,28 +21151,28 @@
                 <a:gridCol w="1143368">
                   <a:extLst>
                     <a:ext uri="{9D8B030D-6E8A-4147-A177-3AD203B41FA5}">
-                      <a16:colId xmlns:a16="http://schemas.microsoft.com/office/drawing/2014/main" val="2009367983"/>
+                      <a16:colId xmlns:a16="http://schemas.microsoft.com/office/drawing/2014/main" xmlns="" val="2009367983"/>
                     </a:ext>
                   </a:extLst>
                 </a:gridCol>
                 <a:gridCol w="3328368">
                   <a:extLst>
                     <a:ext uri="{9D8B030D-6E8A-4147-A177-3AD203B41FA5}">
-                      <a16:colId xmlns:a16="http://schemas.microsoft.com/office/drawing/2014/main" val="3488438301"/>
+                      <a16:colId xmlns:a16="http://schemas.microsoft.com/office/drawing/2014/main" xmlns="" val="3488438301"/>
                     </a:ext>
                   </a:extLst>
                 </a:gridCol>
                 <a:gridCol w="1159043">
                   <a:extLst>
                     <a:ext uri="{9D8B030D-6E8A-4147-A177-3AD203B41FA5}">
-                      <a16:colId xmlns:a16="http://schemas.microsoft.com/office/drawing/2014/main" val="57341383"/>
+                      <a16:colId xmlns:a16="http://schemas.microsoft.com/office/drawing/2014/main" xmlns="" val="57341383"/>
                     </a:ext>
                   </a:extLst>
                 </a:gridCol>
                 <a:gridCol w="3312693">
                   <a:extLst>
                     <a:ext uri="{9D8B030D-6E8A-4147-A177-3AD203B41FA5}">
-                      <a16:colId xmlns:a16="http://schemas.microsoft.com/office/drawing/2014/main" val="3830577718"/>
+                      <a16:colId xmlns:a16="http://schemas.microsoft.com/office/drawing/2014/main" xmlns="" val="3830577718"/>
                     </a:ext>
                   </a:extLst>
                 </a:gridCol>
@@ -21479,7 +21512,7 @@
                 </a:tc>
                 <a:extLst>
                   <a:ext uri="{0D108BD9-81ED-4DB2-BD59-A6C34878D82A}">
-                    <a16:rowId xmlns:a16="http://schemas.microsoft.com/office/drawing/2014/main" val="2378104980"/>
+                    <a16:rowId xmlns:a16="http://schemas.microsoft.com/office/drawing/2014/main" xmlns="" val="2378104980"/>
                   </a:ext>
                 </a:extLst>
               </a:tr>
@@ -21656,7 +21689,7 @@
                 </a:tc>
                 <a:extLst>
                   <a:ext uri="{0D108BD9-81ED-4DB2-BD59-A6C34878D82A}">
-                    <a16:rowId xmlns:a16="http://schemas.microsoft.com/office/drawing/2014/main" val="966726498"/>
+                    <a16:rowId xmlns:a16="http://schemas.microsoft.com/office/drawing/2014/main" xmlns="" val="966726498"/>
                   </a:ext>
                 </a:extLst>
               </a:tr>
@@ -21669,7 +21702,7 @@
           <p:cNvPr id="5" name="그림 4">
             <a:extLst>
               <a:ext uri="{FF2B5EF4-FFF2-40B4-BE49-F238E27FC236}">
-                <a16:creationId xmlns:a16="http://schemas.microsoft.com/office/drawing/2014/main" id="{28A46850-8F4C-7344-168F-75408BF4ED8E}"/>
+                <a16:creationId xmlns:a16="http://schemas.microsoft.com/office/drawing/2014/main" xmlns="" id="{28A46850-8F4C-7344-168F-75408BF4ED8E}"/>
               </a:ext>
             </a:extLst>
           </p:cNvPr>
@@ -21705,7 +21738,7 @@
           <p:cNvPr id="6" name="TextBox 5">
             <a:extLst>
               <a:ext uri="{FF2B5EF4-FFF2-40B4-BE49-F238E27FC236}">
-                <a16:creationId xmlns:a16="http://schemas.microsoft.com/office/drawing/2014/main" id="{EC45B6B9-82C6-4315-485F-45A38566F755}"/>
+                <a16:creationId xmlns:a16="http://schemas.microsoft.com/office/drawing/2014/main" xmlns="" id="{EC45B6B9-82C6-4315-485F-45A38566F755}"/>
               </a:ext>
             </a:extLst>
           </p:cNvPr>
@@ -21778,7 +21811,7 @@
           <p:cNvPr id="2" name="바닥글 개체 틀 1">
             <a:extLst>
               <a:ext uri="{FF2B5EF4-FFF2-40B4-BE49-F238E27FC236}">
-                <a16:creationId xmlns:a16="http://schemas.microsoft.com/office/drawing/2014/main" id="{6AF1B24E-7C31-D352-239D-5307CEE5F3BA}"/>
+                <a16:creationId xmlns:a16="http://schemas.microsoft.com/office/drawing/2014/main" xmlns="" id="{6AF1B24E-7C31-D352-239D-5307CEE5F3BA}"/>
               </a:ext>
             </a:extLst>
           </p:cNvPr>
@@ -21808,7 +21841,7 @@
           <p:cNvPr id="3" name="표 3">
             <a:extLst>
               <a:ext uri="{FF2B5EF4-FFF2-40B4-BE49-F238E27FC236}">
-                <a16:creationId xmlns:a16="http://schemas.microsoft.com/office/drawing/2014/main" id="{83E41BCA-5946-F23B-DDB2-A15A43C3D242}"/>
+                <a16:creationId xmlns:a16="http://schemas.microsoft.com/office/drawing/2014/main" xmlns="" id="{83E41BCA-5946-F23B-DDB2-A15A43C3D242}"/>
               </a:ext>
             </a:extLst>
           </p:cNvPr>
@@ -21831,28 +21864,28 @@
                 <a:gridCol w="1143368">
                   <a:extLst>
                     <a:ext uri="{9D8B030D-6E8A-4147-A177-3AD203B41FA5}">
-                      <a16:colId xmlns:a16="http://schemas.microsoft.com/office/drawing/2014/main" val="2009367983"/>
+                      <a16:colId xmlns:a16="http://schemas.microsoft.com/office/drawing/2014/main" xmlns="" val="2009367983"/>
                     </a:ext>
                   </a:extLst>
                 </a:gridCol>
                 <a:gridCol w="3328368">
                   <a:extLst>
                     <a:ext uri="{9D8B030D-6E8A-4147-A177-3AD203B41FA5}">
-                      <a16:colId xmlns:a16="http://schemas.microsoft.com/office/drawing/2014/main" val="3488438301"/>
+                      <a16:colId xmlns:a16="http://schemas.microsoft.com/office/drawing/2014/main" xmlns="" val="3488438301"/>
                     </a:ext>
                   </a:extLst>
                 </a:gridCol>
                 <a:gridCol w="1159043">
                   <a:extLst>
                     <a:ext uri="{9D8B030D-6E8A-4147-A177-3AD203B41FA5}">
-                      <a16:colId xmlns:a16="http://schemas.microsoft.com/office/drawing/2014/main" val="57341383"/>
+                      <a16:colId xmlns:a16="http://schemas.microsoft.com/office/drawing/2014/main" xmlns="" val="57341383"/>
                     </a:ext>
                   </a:extLst>
                 </a:gridCol>
                 <a:gridCol w="3312693">
                   <a:extLst>
                     <a:ext uri="{9D8B030D-6E8A-4147-A177-3AD203B41FA5}">
-                      <a16:colId xmlns:a16="http://schemas.microsoft.com/office/drawing/2014/main" val="3830577718"/>
+                      <a16:colId xmlns:a16="http://schemas.microsoft.com/office/drawing/2014/main" xmlns="" val="3830577718"/>
                     </a:ext>
                   </a:extLst>
                 </a:gridCol>
@@ -22192,7 +22225,7 @@
                 </a:tc>
                 <a:extLst>
                   <a:ext uri="{0D108BD9-81ED-4DB2-BD59-A6C34878D82A}">
-                    <a16:rowId xmlns:a16="http://schemas.microsoft.com/office/drawing/2014/main" val="2378104980"/>
+                    <a16:rowId xmlns:a16="http://schemas.microsoft.com/office/drawing/2014/main" xmlns="" val="2378104980"/>
                   </a:ext>
                 </a:extLst>
               </a:tr>
@@ -22369,7 +22402,7 @@
                 </a:tc>
                 <a:extLst>
                   <a:ext uri="{0D108BD9-81ED-4DB2-BD59-A6C34878D82A}">
-                    <a16:rowId xmlns:a16="http://schemas.microsoft.com/office/drawing/2014/main" val="966726498"/>
+                    <a16:rowId xmlns:a16="http://schemas.microsoft.com/office/drawing/2014/main" xmlns="" val="966726498"/>
                   </a:ext>
                 </a:extLst>
               </a:tr>
@@ -22382,7 +22415,7 @@
           <p:cNvPr id="5" name="그림 4">
             <a:extLst>
               <a:ext uri="{FF2B5EF4-FFF2-40B4-BE49-F238E27FC236}">
-                <a16:creationId xmlns:a16="http://schemas.microsoft.com/office/drawing/2014/main" id="{0D47B6A9-FA1B-DA73-4A52-CF90F235F0BB}"/>
+                <a16:creationId xmlns:a16="http://schemas.microsoft.com/office/drawing/2014/main" xmlns="" id="{0D47B6A9-FA1B-DA73-4A52-CF90F235F0BB}"/>
               </a:ext>
             </a:extLst>
           </p:cNvPr>
@@ -22412,7 +22445,7 @@
           <p:cNvPr id="6" name="TextBox 5">
             <a:extLst>
               <a:ext uri="{FF2B5EF4-FFF2-40B4-BE49-F238E27FC236}">
-                <a16:creationId xmlns:a16="http://schemas.microsoft.com/office/drawing/2014/main" id="{A7B2363B-2A67-0214-C83F-EE1FACE197C9}"/>
+                <a16:creationId xmlns:a16="http://schemas.microsoft.com/office/drawing/2014/main" xmlns="" id="{A7B2363B-2A67-0214-C83F-EE1FACE197C9}"/>
               </a:ext>
             </a:extLst>
           </p:cNvPr>
@@ -22485,7 +22518,7 @@
           <p:cNvPr id="2" name="바닥글 개체 틀 1">
             <a:extLst>
               <a:ext uri="{FF2B5EF4-FFF2-40B4-BE49-F238E27FC236}">
-                <a16:creationId xmlns:a16="http://schemas.microsoft.com/office/drawing/2014/main" id="{6AF1B24E-7C31-D352-239D-5307CEE5F3BA}"/>
+                <a16:creationId xmlns:a16="http://schemas.microsoft.com/office/drawing/2014/main" xmlns="" id="{6AF1B24E-7C31-D352-239D-5307CEE5F3BA}"/>
               </a:ext>
             </a:extLst>
           </p:cNvPr>
@@ -22515,7 +22548,7 @@
           <p:cNvPr id="3" name="표 3">
             <a:extLst>
               <a:ext uri="{FF2B5EF4-FFF2-40B4-BE49-F238E27FC236}">
-                <a16:creationId xmlns:a16="http://schemas.microsoft.com/office/drawing/2014/main" id="{83E41BCA-5946-F23B-DDB2-A15A43C3D242}"/>
+                <a16:creationId xmlns:a16="http://schemas.microsoft.com/office/drawing/2014/main" xmlns="" id="{83E41BCA-5946-F23B-DDB2-A15A43C3D242}"/>
               </a:ext>
             </a:extLst>
           </p:cNvPr>
@@ -22538,28 +22571,28 @@
                 <a:gridCol w="1143368">
                   <a:extLst>
                     <a:ext uri="{9D8B030D-6E8A-4147-A177-3AD203B41FA5}">
-                      <a16:colId xmlns:a16="http://schemas.microsoft.com/office/drawing/2014/main" val="2009367983"/>
+                      <a16:colId xmlns:a16="http://schemas.microsoft.com/office/drawing/2014/main" xmlns="" val="2009367983"/>
                     </a:ext>
                   </a:extLst>
                 </a:gridCol>
                 <a:gridCol w="3328368">
                   <a:extLst>
                     <a:ext uri="{9D8B030D-6E8A-4147-A177-3AD203B41FA5}">
-                      <a16:colId xmlns:a16="http://schemas.microsoft.com/office/drawing/2014/main" val="3488438301"/>
+                      <a16:colId xmlns:a16="http://schemas.microsoft.com/office/drawing/2014/main" xmlns="" val="3488438301"/>
                     </a:ext>
                   </a:extLst>
                 </a:gridCol>
                 <a:gridCol w="1159043">
                   <a:extLst>
                     <a:ext uri="{9D8B030D-6E8A-4147-A177-3AD203B41FA5}">
-                      <a16:colId xmlns:a16="http://schemas.microsoft.com/office/drawing/2014/main" val="57341383"/>
+                      <a16:colId xmlns:a16="http://schemas.microsoft.com/office/drawing/2014/main" xmlns="" val="57341383"/>
                     </a:ext>
                   </a:extLst>
                 </a:gridCol>
                 <a:gridCol w="3312693">
                   <a:extLst>
                     <a:ext uri="{9D8B030D-6E8A-4147-A177-3AD203B41FA5}">
-                      <a16:colId xmlns:a16="http://schemas.microsoft.com/office/drawing/2014/main" val="3830577718"/>
+                      <a16:colId xmlns:a16="http://schemas.microsoft.com/office/drawing/2014/main" xmlns="" val="3830577718"/>
                     </a:ext>
                   </a:extLst>
                 </a:gridCol>
@@ -22899,7 +22932,7 @@
                 </a:tc>
                 <a:extLst>
                   <a:ext uri="{0D108BD9-81ED-4DB2-BD59-A6C34878D82A}">
-                    <a16:rowId xmlns:a16="http://schemas.microsoft.com/office/drawing/2014/main" val="2378104980"/>
+                    <a16:rowId xmlns:a16="http://schemas.microsoft.com/office/drawing/2014/main" xmlns="" val="2378104980"/>
                   </a:ext>
                 </a:extLst>
               </a:tr>
@@ -23076,7 +23109,7 @@
                 </a:tc>
                 <a:extLst>
                   <a:ext uri="{0D108BD9-81ED-4DB2-BD59-A6C34878D82A}">
-                    <a16:rowId xmlns:a16="http://schemas.microsoft.com/office/drawing/2014/main" val="966726498"/>
+                    <a16:rowId xmlns:a16="http://schemas.microsoft.com/office/drawing/2014/main" xmlns="" val="966726498"/>
                   </a:ext>
                 </a:extLst>
               </a:tr>
@@ -23089,7 +23122,7 @@
           <p:cNvPr id="6" name="TextBox 5">
             <a:extLst>
               <a:ext uri="{FF2B5EF4-FFF2-40B4-BE49-F238E27FC236}">
-                <a16:creationId xmlns:a16="http://schemas.microsoft.com/office/drawing/2014/main" id="{52B8DB11-317A-6EA0-E5BA-09084835A1DC}"/>
+                <a16:creationId xmlns:a16="http://schemas.microsoft.com/office/drawing/2014/main" xmlns="" id="{52B8DB11-317A-6EA0-E5BA-09084835A1DC}"/>
               </a:ext>
             </a:extLst>
           </p:cNvPr>
@@ -23124,7 +23157,7 @@
           <p:cNvPr id="10" name="그림 9">
             <a:extLst>
               <a:ext uri="{FF2B5EF4-FFF2-40B4-BE49-F238E27FC236}">
-                <a16:creationId xmlns:a16="http://schemas.microsoft.com/office/drawing/2014/main" id="{5D7A91B2-5543-B950-A2DA-1EE03AB01412}"/>
+                <a16:creationId xmlns:a16="http://schemas.microsoft.com/office/drawing/2014/main" xmlns="" id="{5D7A91B2-5543-B950-A2DA-1EE03AB01412}"/>
               </a:ext>
             </a:extLst>
           </p:cNvPr>
@@ -23190,7 +23223,7 @@
           <p:cNvPr id="2" name="바닥글 개체 틀 1">
             <a:extLst>
               <a:ext uri="{FF2B5EF4-FFF2-40B4-BE49-F238E27FC236}">
-                <a16:creationId xmlns:a16="http://schemas.microsoft.com/office/drawing/2014/main" id="{6AF1B24E-7C31-D352-239D-5307CEE5F3BA}"/>
+                <a16:creationId xmlns:a16="http://schemas.microsoft.com/office/drawing/2014/main" xmlns="" id="{6AF1B24E-7C31-D352-239D-5307CEE5F3BA}"/>
               </a:ext>
             </a:extLst>
           </p:cNvPr>
@@ -23220,7 +23253,7 @@
           <p:cNvPr id="3" name="표 3">
             <a:extLst>
               <a:ext uri="{FF2B5EF4-FFF2-40B4-BE49-F238E27FC236}">
-                <a16:creationId xmlns:a16="http://schemas.microsoft.com/office/drawing/2014/main" id="{83E41BCA-5946-F23B-DDB2-A15A43C3D242}"/>
+                <a16:creationId xmlns:a16="http://schemas.microsoft.com/office/drawing/2014/main" xmlns="" id="{83E41BCA-5946-F23B-DDB2-A15A43C3D242}"/>
               </a:ext>
             </a:extLst>
           </p:cNvPr>
@@ -23243,28 +23276,28 @@
                 <a:gridCol w="1143368">
                   <a:extLst>
                     <a:ext uri="{9D8B030D-6E8A-4147-A177-3AD203B41FA5}">
-                      <a16:colId xmlns:a16="http://schemas.microsoft.com/office/drawing/2014/main" val="2009367983"/>
+                      <a16:colId xmlns:a16="http://schemas.microsoft.com/office/drawing/2014/main" xmlns="" val="2009367983"/>
                     </a:ext>
                   </a:extLst>
                 </a:gridCol>
                 <a:gridCol w="3328368">
                   <a:extLst>
                     <a:ext uri="{9D8B030D-6E8A-4147-A177-3AD203B41FA5}">
-                      <a16:colId xmlns:a16="http://schemas.microsoft.com/office/drawing/2014/main" val="3488438301"/>
+                      <a16:colId xmlns:a16="http://schemas.microsoft.com/office/drawing/2014/main" xmlns="" val="3488438301"/>
                     </a:ext>
                   </a:extLst>
                 </a:gridCol>
                 <a:gridCol w="1159043">
                   <a:extLst>
                     <a:ext uri="{9D8B030D-6E8A-4147-A177-3AD203B41FA5}">
-                      <a16:colId xmlns:a16="http://schemas.microsoft.com/office/drawing/2014/main" val="57341383"/>
+                      <a16:colId xmlns:a16="http://schemas.microsoft.com/office/drawing/2014/main" xmlns="" val="57341383"/>
                     </a:ext>
                   </a:extLst>
                 </a:gridCol>
                 <a:gridCol w="3312693">
                   <a:extLst>
                     <a:ext uri="{9D8B030D-6E8A-4147-A177-3AD203B41FA5}">
-                      <a16:colId xmlns:a16="http://schemas.microsoft.com/office/drawing/2014/main" val="3830577718"/>
+                      <a16:colId xmlns:a16="http://schemas.microsoft.com/office/drawing/2014/main" xmlns="" val="3830577718"/>
                     </a:ext>
                   </a:extLst>
                 </a:gridCol>
@@ -23604,7 +23637,7 @@
                 </a:tc>
                 <a:extLst>
                   <a:ext uri="{0D108BD9-81ED-4DB2-BD59-A6C34878D82A}">
-                    <a16:rowId xmlns:a16="http://schemas.microsoft.com/office/drawing/2014/main" val="2378104980"/>
+                    <a16:rowId xmlns:a16="http://schemas.microsoft.com/office/drawing/2014/main" xmlns="" val="2378104980"/>
                   </a:ext>
                 </a:extLst>
               </a:tr>
@@ -23781,7 +23814,7 @@
                 </a:tc>
                 <a:extLst>
                   <a:ext uri="{0D108BD9-81ED-4DB2-BD59-A6C34878D82A}">
-                    <a16:rowId xmlns:a16="http://schemas.microsoft.com/office/drawing/2014/main" val="966726498"/>
+                    <a16:rowId xmlns:a16="http://schemas.microsoft.com/office/drawing/2014/main" xmlns="" val="966726498"/>
                   </a:ext>
                 </a:extLst>
               </a:tr>
@@ -23794,7 +23827,7 @@
           <p:cNvPr id="6" name="TextBox 5">
             <a:extLst>
               <a:ext uri="{FF2B5EF4-FFF2-40B4-BE49-F238E27FC236}">
-                <a16:creationId xmlns:a16="http://schemas.microsoft.com/office/drawing/2014/main" id="{F20E0FEA-5999-7611-858C-253ABF15E587}"/>
+                <a16:creationId xmlns:a16="http://schemas.microsoft.com/office/drawing/2014/main" xmlns="" id="{F20E0FEA-5999-7611-858C-253ABF15E587}"/>
               </a:ext>
             </a:extLst>
           </p:cNvPr>
@@ -23853,7 +23886,7 @@
           <p:cNvPr id="8" name="그림 7">
             <a:extLst>
               <a:ext uri="{FF2B5EF4-FFF2-40B4-BE49-F238E27FC236}">
-                <a16:creationId xmlns:a16="http://schemas.microsoft.com/office/drawing/2014/main" id="{851A9090-7D83-FF87-2D64-0E2D9E79D04F}"/>
+                <a16:creationId xmlns:a16="http://schemas.microsoft.com/office/drawing/2014/main" xmlns="" id="{851A9090-7D83-FF87-2D64-0E2D9E79D04F}"/>
               </a:ext>
             </a:extLst>
           </p:cNvPr>
@@ -23919,7 +23952,7 @@
           <p:cNvPr id="2" name="바닥글 개체 틀 1">
             <a:extLst>
               <a:ext uri="{FF2B5EF4-FFF2-40B4-BE49-F238E27FC236}">
-                <a16:creationId xmlns:a16="http://schemas.microsoft.com/office/drawing/2014/main" id="{6AF1B24E-7C31-D352-239D-5307CEE5F3BA}"/>
+                <a16:creationId xmlns:a16="http://schemas.microsoft.com/office/drawing/2014/main" xmlns="" id="{6AF1B24E-7C31-D352-239D-5307CEE5F3BA}"/>
               </a:ext>
             </a:extLst>
           </p:cNvPr>
@@ -23949,7 +23982,7 @@
           <p:cNvPr id="3" name="표 3">
             <a:extLst>
               <a:ext uri="{FF2B5EF4-FFF2-40B4-BE49-F238E27FC236}">
-                <a16:creationId xmlns:a16="http://schemas.microsoft.com/office/drawing/2014/main" id="{83E41BCA-5946-F23B-DDB2-A15A43C3D242}"/>
+                <a16:creationId xmlns:a16="http://schemas.microsoft.com/office/drawing/2014/main" xmlns="" id="{83E41BCA-5946-F23B-DDB2-A15A43C3D242}"/>
               </a:ext>
             </a:extLst>
           </p:cNvPr>
@@ -23972,28 +24005,28 @@
                 <a:gridCol w="1143368">
                   <a:extLst>
                     <a:ext uri="{9D8B030D-6E8A-4147-A177-3AD203B41FA5}">
-                      <a16:colId xmlns:a16="http://schemas.microsoft.com/office/drawing/2014/main" val="2009367983"/>
+                      <a16:colId xmlns:a16="http://schemas.microsoft.com/office/drawing/2014/main" xmlns="" val="2009367983"/>
                     </a:ext>
                   </a:extLst>
                 </a:gridCol>
                 <a:gridCol w="3328368">
                   <a:extLst>
                     <a:ext uri="{9D8B030D-6E8A-4147-A177-3AD203B41FA5}">
-                      <a16:colId xmlns:a16="http://schemas.microsoft.com/office/drawing/2014/main" val="3488438301"/>
+                      <a16:colId xmlns:a16="http://schemas.microsoft.com/office/drawing/2014/main" xmlns="" val="3488438301"/>
                     </a:ext>
                   </a:extLst>
                 </a:gridCol>
                 <a:gridCol w="1159043">
                   <a:extLst>
                     <a:ext uri="{9D8B030D-6E8A-4147-A177-3AD203B41FA5}">
-                      <a16:colId xmlns:a16="http://schemas.microsoft.com/office/drawing/2014/main" val="57341383"/>
+                      <a16:colId xmlns:a16="http://schemas.microsoft.com/office/drawing/2014/main" xmlns="" val="57341383"/>
                     </a:ext>
                   </a:extLst>
                 </a:gridCol>
                 <a:gridCol w="3312693">
                   <a:extLst>
                     <a:ext uri="{9D8B030D-6E8A-4147-A177-3AD203B41FA5}">
-                      <a16:colId xmlns:a16="http://schemas.microsoft.com/office/drawing/2014/main" val="3830577718"/>
+                      <a16:colId xmlns:a16="http://schemas.microsoft.com/office/drawing/2014/main" xmlns="" val="3830577718"/>
                     </a:ext>
                   </a:extLst>
                 </a:gridCol>
@@ -24333,7 +24366,7 @@
                 </a:tc>
                 <a:extLst>
                   <a:ext uri="{0D108BD9-81ED-4DB2-BD59-A6C34878D82A}">
-                    <a16:rowId xmlns:a16="http://schemas.microsoft.com/office/drawing/2014/main" val="2378104980"/>
+                    <a16:rowId xmlns:a16="http://schemas.microsoft.com/office/drawing/2014/main" xmlns="" val="2378104980"/>
                   </a:ext>
                 </a:extLst>
               </a:tr>
@@ -24510,7 +24543,7 @@
                 </a:tc>
                 <a:extLst>
                   <a:ext uri="{0D108BD9-81ED-4DB2-BD59-A6C34878D82A}">
-                    <a16:rowId xmlns:a16="http://schemas.microsoft.com/office/drawing/2014/main" val="966726498"/>
+                    <a16:rowId xmlns:a16="http://schemas.microsoft.com/office/drawing/2014/main" xmlns="" val="966726498"/>
                   </a:ext>
                 </a:extLst>
               </a:tr>
@@ -24523,7 +24556,7 @@
           <p:cNvPr id="5" name="그림 4">
             <a:extLst>
               <a:ext uri="{FF2B5EF4-FFF2-40B4-BE49-F238E27FC236}">
-                <a16:creationId xmlns:a16="http://schemas.microsoft.com/office/drawing/2014/main" id="{7369278A-2F0C-F2AF-29ED-606DCF28589F}"/>
+                <a16:creationId xmlns:a16="http://schemas.microsoft.com/office/drawing/2014/main" xmlns="" id="{7369278A-2F0C-F2AF-29ED-606DCF28589F}"/>
               </a:ext>
             </a:extLst>
           </p:cNvPr>
@@ -24553,7 +24586,7 @@
           <p:cNvPr id="6" name="TextBox 5">
             <a:extLst>
               <a:ext uri="{FF2B5EF4-FFF2-40B4-BE49-F238E27FC236}">
-                <a16:creationId xmlns:a16="http://schemas.microsoft.com/office/drawing/2014/main" id="{17B63104-9E46-A289-3450-4360D499396B}"/>
+                <a16:creationId xmlns:a16="http://schemas.microsoft.com/office/drawing/2014/main" xmlns="" id="{17B63104-9E46-A289-3450-4360D499396B}"/>
               </a:ext>
             </a:extLst>
           </p:cNvPr>
@@ -24618,7 +24651,7 @@
           <p:cNvPr id="2" name="바닥글 개체 틀 1">
             <a:extLst>
               <a:ext uri="{FF2B5EF4-FFF2-40B4-BE49-F238E27FC236}">
-                <a16:creationId xmlns:a16="http://schemas.microsoft.com/office/drawing/2014/main" id="{6AF1B24E-7C31-D352-239D-5307CEE5F3BA}"/>
+                <a16:creationId xmlns:a16="http://schemas.microsoft.com/office/drawing/2014/main" xmlns="" id="{6AF1B24E-7C31-D352-239D-5307CEE5F3BA}"/>
               </a:ext>
             </a:extLst>
           </p:cNvPr>
@@ -24648,7 +24681,7 @@
           <p:cNvPr id="3" name="표 3">
             <a:extLst>
               <a:ext uri="{FF2B5EF4-FFF2-40B4-BE49-F238E27FC236}">
-                <a16:creationId xmlns:a16="http://schemas.microsoft.com/office/drawing/2014/main" id="{83E41BCA-5946-F23B-DDB2-A15A43C3D242}"/>
+                <a16:creationId xmlns:a16="http://schemas.microsoft.com/office/drawing/2014/main" xmlns="" id="{83E41BCA-5946-F23B-DDB2-A15A43C3D242}"/>
               </a:ext>
             </a:extLst>
           </p:cNvPr>
@@ -24671,28 +24704,28 @@
                 <a:gridCol w="1143368">
                   <a:extLst>
                     <a:ext uri="{9D8B030D-6E8A-4147-A177-3AD203B41FA5}">
-                      <a16:colId xmlns:a16="http://schemas.microsoft.com/office/drawing/2014/main" val="2009367983"/>
+                      <a16:colId xmlns:a16="http://schemas.microsoft.com/office/drawing/2014/main" xmlns="" val="2009367983"/>
                     </a:ext>
                   </a:extLst>
                 </a:gridCol>
                 <a:gridCol w="3328368">
                   <a:extLst>
                     <a:ext uri="{9D8B030D-6E8A-4147-A177-3AD203B41FA5}">
-                      <a16:colId xmlns:a16="http://schemas.microsoft.com/office/drawing/2014/main" val="3488438301"/>
+                      <a16:colId xmlns:a16="http://schemas.microsoft.com/office/drawing/2014/main" xmlns="" val="3488438301"/>
                     </a:ext>
                   </a:extLst>
                 </a:gridCol>
                 <a:gridCol w="1159043">
                   <a:extLst>
                     <a:ext uri="{9D8B030D-6E8A-4147-A177-3AD203B41FA5}">
-                      <a16:colId xmlns:a16="http://schemas.microsoft.com/office/drawing/2014/main" val="57341383"/>
+                      <a16:colId xmlns:a16="http://schemas.microsoft.com/office/drawing/2014/main" xmlns="" val="57341383"/>
                     </a:ext>
                   </a:extLst>
                 </a:gridCol>
                 <a:gridCol w="3312693">
                   <a:extLst>
                     <a:ext uri="{9D8B030D-6E8A-4147-A177-3AD203B41FA5}">
-                      <a16:colId xmlns:a16="http://schemas.microsoft.com/office/drawing/2014/main" val="3830577718"/>
+                      <a16:colId xmlns:a16="http://schemas.microsoft.com/office/drawing/2014/main" xmlns="" val="3830577718"/>
                     </a:ext>
                   </a:extLst>
                 </a:gridCol>
@@ -25032,7 +25065,7 @@
                 </a:tc>
                 <a:extLst>
                   <a:ext uri="{0D108BD9-81ED-4DB2-BD59-A6C34878D82A}">
-                    <a16:rowId xmlns:a16="http://schemas.microsoft.com/office/drawing/2014/main" val="2378104980"/>
+                    <a16:rowId xmlns:a16="http://schemas.microsoft.com/office/drawing/2014/main" xmlns="" val="2378104980"/>
                   </a:ext>
                 </a:extLst>
               </a:tr>
@@ -25209,7 +25242,7 @@
                 </a:tc>
                 <a:extLst>
                   <a:ext uri="{0D108BD9-81ED-4DB2-BD59-A6C34878D82A}">
-                    <a16:rowId xmlns:a16="http://schemas.microsoft.com/office/drawing/2014/main" val="966726498"/>
+                    <a16:rowId xmlns:a16="http://schemas.microsoft.com/office/drawing/2014/main" xmlns="" val="966726498"/>
                   </a:ext>
                 </a:extLst>
               </a:tr>
@@ -25222,7 +25255,7 @@
           <p:cNvPr id="5" name="그림 4">
             <a:extLst>
               <a:ext uri="{FF2B5EF4-FFF2-40B4-BE49-F238E27FC236}">
-                <a16:creationId xmlns:a16="http://schemas.microsoft.com/office/drawing/2014/main" id="{43F17B86-3BD5-3472-7A8F-F04E9FA72C37}"/>
+                <a16:creationId xmlns:a16="http://schemas.microsoft.com/office/drawing/2014/main" xmlns="" id="{43F17B86-3BD5-3472-7A8F-F04E9FA72C37}"/>
               </a:ext>
             </a:extLst>
           </p:cNvPr>
@@ -25252,7 +25285,7 @@
           <p:cNvPr id="6" name="TextBox 5">
             <a:extLst>
               <a:ext uri="{FF2B5EF4-FFF2-40B4-BE49-F238E27FC236}">
-                <a16:creationId xmlns:a16="http://schemas.microsoft.com/office/drawing/2014/main" id="{5E05F980-ECB6-EA57-D68A-93E86BB7FF5E}"/>
+                <a16:creationId xmlns:a16="http://schemas.microsoft.com/office/drawing/2014/main" xmlns="" id="{5E05F980-ECB6-EA57-D68A-93E86BB7FF5E}"/>
               </a:ext>
             </a:extLst>
           </p:cNvPr>

</xml_diff>